<commit_message>
melhoria das imagens das arquiteturas de instalação suportadas
</commit_message>
<xml_diff>
--- a/guiadousuario/images/Network Architecture 2D - EPM Processor.pptx
+++ b/guiadousuario/images/Network Architecture 2D - EPM Processor.pptx
@@ -117,10 +117,6 @@
 </p:presentation>
 </file>
 
-<file path=ppt/revisionInfo.xml><?xml version="1.0" encoding="utf-8"?>
-<p1510:revInfo xmlns:a="http://schemas.openxmlformats.org/drawingml/2006/main" xmlns:r="http://schemas.openxmlformats.org/officeDocument/2006/relationships" xmlns:p1510="http://schemas.microsoft.com/office/powerpoint/2015/10/main"/>
-</file>
-
 <file path=ppt/slideLayouts/slideLayout1.xml><?xml version="1.0" encoding="utf-8"?>
 <p:sldLayout xmlns:a="http://schemas.openxmlformats.org/drawingml/2006/main" xmlns:r="http://schemas.openxmlformats.org/officeDocument/2006/relationships" xmlns:p="http://schemas.openxmlformats.org/presentationml/2006/main" type="title" preserve="1">
   <p:cSld name="Title Slide">
@@ -252,7 +248,7 @@
           <a:p>
             <a:fld id="{A5BAA33C-0785-4A1B-865C-67CE1AB5BD5D}" type="datetimeFigureOut">
               <a:rPr lang="pt-BR" smtClean="0"/>
-              <a:t>09/08/2018</a:t>
+              <a:t>17/07/2019</a:t>
             </a:fld>
             <a:endParaRPr lang="pt-BR"/>
           </a:p>
@@ -294,7 +290,7 @@
           <a:p>
             <a:fld id="{AAA6B9FE-EE70-444C-8828-DB5DEA8E017A}" type="slidenum">
               <a:rPr lang="pt-BR" smtClean="0"/>
-              <a:t>‹#›</a:t>
+              <a:t>‹nº›</a:t>
             </a:fld>
             <a:endParaRPr lang="pt-BR"/>
           </a:p>
@@ -422,7 +418,7 @@
           <a:p>
             <a:fld id="{A5BAA33C-0785-4A1B-865C-67CE1AB5BD5D}" type="datetimeFigureOut">
               <a:rPr lang="pt-BR" smtClean="0"/>
-              <a:t>09/08/2018</a:t>
+              <a:t>17/07/2019</a:t>
             </a:fld>
             <a:endParaRPr lang="pt-BR"/>
           </a:p>
@@ -464,7 +460,7 @@
           <a:p>
             <a:fld id="{AAA6B9FE-EE70-444C-8828-DB5DEA8E017A}" type="slidenum">
               <a:rPr lang="pt-BR" smtClean="0"/>
-              <a:t>‹#›</a:t>
+              <a:t>‹nº›</a:t>
             </a:fld>
             <a:endParaRPr lang="pt-BR"/>
           </a:p>
@@ -602,7 +598,7 @@
           <a:p>
             <a:fld id="{A5BAA33C-0785-4A1B-865C-67CE1AB5BD5D}" type="datetimeFigureOut">
               <a:rPr lang="pt-BR" smtClean="0"/>
-              <a:t>09/08/2018</a:t>
+              <a:t>17/07/2019</a:t>
             </a:fld>
             <a:endParaRPr lang="pt-BR"/>
           </a:p>
@@ -644,7 +640,7 @@
           <a:p>
             <a:fld id="{AAA6B9FE-EE70-444C-8828-DB5DEA8E017A}" type="slidenum">
               <a:rPr lang="pt-BR" smtClean="0"/>
-              <a:t>‹#›</a:t>
+              <a:t>‹nº›</a:t>
             </a:fld>
             <a:endParaRPr lang="pt-BR"/>
           </a:p>
@@ -772,7 +768,7 @@
           <a:p>
             <a:fld id="{A5BAA33C-0785-4A1B-865C-67CE1AB5BD5D}" type="datetimeFigureOut">
               <a:rPr lang="pt-BR" smtClean="0"/>
-              <a:t>09/08/2018</a:t>
+              <a:t>17/07/2019</a:t>
             </a:fld>
             <a:endParaRPr lang="pt-BR"/>
           </a:p>
@@ -814,7 +810,7 @@
           <a:p>
             <a:fld id="{AAA6B9FE-EE70-444C-8828-DB5DEA8E017A}" type="slidenum">
               <a:rPr lang="pt-BR" smtClean="0"/>
-              <a:t>‹#›</a:t>
+              <a:t>‹nº›</a:t>
             </a:fld>
             <a:endParaRPr lang="pt-BR"/>
           </a:p>
@@ -1018,7 +1014,7 @@
           <a:p>
             <a:fld id="{A5BAA33C-0785-4A1B-865C-67CE1AB5BD5D}" type="datetimeFigureOut">
               <a:rPr lang="pt-BR" smtClean="0"/>
-              <a:t>09/08/2018</a:t>
+              <a:t>17/07/2019</a:t>
             </a:fld>
             <a:endParaRPr lang="pt-BR"/>
           </a:p>
@@ -1060,7 +1056,7 @@
           <a:p>
             <a:fld id="{AAA6B9FE-EE70-444C-8828-DB5DEA8E017A}" type="slidenum">
               <a:rPr lang="pt-BR" smtClean="0"/>
-              <a:t>‹#›</a:t>
+              <a:t>‹nº›</a:t>
             </a:fld>
             <a:endParaRPr lang="pt-BR"/>
           </a:p>
@@ -1250,7 +1246,7 @@
           <a:p>
             <a:fld id="{A5BAA33C-0785-4A1B-865C-67CE1AB5BD5D}" type="datetimeFigureOut">
               <a:rPr lang="pt-BR" smtClean="0"/>
-              <a:t>09/08/2018</a:t>
+              <a:t>17/07/2019</a:t>
             </a:fld>
             <a:endParaRPr lang="pt-BR"/>
           </a:p>
@@ -1292,7 +1288,7 @@
           <a:p>
             <a:fld id="{AAA6B9FE-EE70-444C-8828-DB5DEA8E017A}" type="slidenum">
               <a:rPr lang="pt-BR" smtClean="0"/>
-              <a:t>‹#›</a:t>
+              <a:t>‹nº›</a:t>
             </a:fld>
             <a:endParaRPr lang="pt-BR"/>
           </a:p>
@@ -1617,7 +1613,7 @@
           <a:p>
             <a:fld id="{A5BAA33C-0785-4A1B-865C-67CE1AB5BD5D}" type="datetimeFigureOut">
               <a:rPr lang="pt-BR" smtClean="0"/>
-              <a:t>09/08/2018</a:t>
+              <a:t>17/07/2019</a:t>
             </a:fld>
             <a:endParaRPr lang="pt-BR"/>
           </a:p>
@@ -1659,7 +1655,7 @@
           <a:p>
             <a:fld id="{AAA6B9FE-EE70-444C-8828-DB5DEA8E017A}" type="slidenum">
               <a:rPr lang="pt-BR" smtClean="0"/>
-              <a:t>‹#›</a:t>
+              <a:t>‹nº›</a:t>
             </a:fld>
             <a:endParaRPr lang="pt-BR"/>
           </a:p>
@@ -1735,7 +1731,7 @@
           <a:p>
             <a:fld id="{A5BAA33C-0785-4A1B-865C-67CE1AB5BD5D}" type="datetimeFigureOut">
               <a:rPr lang="pt-BR" smtClean="0"/>
-              <a:t>09/08/2018</a:t>
+              <a:t>17/07/2019</a:t>
             </a:fld>
             <a:endParaRPr lang="pt-BR"/>
           </a:p>
@@ -1777,7 +1773,7 @@
           <a:p>
             <a:fld id="{AAA6B9FE-EE70-444C-8828-DB5DEA8E017A}" type="slidenum">
               <a:rPr lang="pt-BR" smtClean="0"/>
-              <a:t>‹#›</a:t>
+              <a:t>‹nº›</a:t>
             </a:fld>
             <a:endParaRPr lang="pt-BR"/>
           </a:p>
@@ -1830,7 +1826,7 @@
           <a:p>
             <a:fld id="{A5BAA33C-0785-4A1B-865C-67CE1AB5BD5D}" type="datetimeFigureOut">
               <a:rPr lang="pt-BR" smtClean="0"/>
-              <a:t>09/08/2018</a:t>
+              <a:t>17/07/2019</a:t>
             </a:fld>
             <a:endParaRPr lang="pt-BR"/>
           </a:p>
@@ -1872,7 +1868,7 @@
           <a:p>
             <a:fld id="{AAA6B9FE-EE70-444C-8828-DB5DEA8E017A}" type="slidenum">
               <a:rPr lang="pt-BR" smtClean="0"/>
-              <a:t>‹#›</a:t>
+              <a:t>‹nº›</a:t>
             </a:fld>
             <a:endParaRPr lang="pt-BR"/>
           </a:p>
@@ -2107,7 +2103,7 @@
           <a:p>
             <a:fld id="{A5BAA33C-0785-4A1B-865C-67CE1AB5BD5D}" type="datetimeFigureOut">
               <a:rPr lang="pt-BR" smtClean="0"/>
-              <a:t>09/08/2018</a:t>
+              <a:t>17/07/2019</a:t>
             </a:fld>
             <a:endParaRPr lang="pt-BR"/>
           </a:p>
@@ -2149,7 +2145,7 @@
           <a:p>
             <a:fld id="{AAA6B9FE-EE70-444C-8828-DB5DEA8E017A}" type="slidenum">
               <a:rPr lang="pt-BR" smtClean="0"/>
-              <a:t>‹#›</a:t>
+              <a:t>‹nº›</a:t>
             </a:fld>
             <a:endParaRPr lang="pt-BR"/>
           </a:p>
@@ -2360,7 +2356,7 @@
           <a:p>
             <a:fld id="{A5BAA33C-0785-4A1B-865C-67CE1AB5BD5D}" type="datetimeFigureOut">
               <a:rPr lang="pt-BR" smtClean="0"/>
-              <a:t>09/08/2018</a:t>
+              <a:t>17/07/2019</a:t>
             </a:fld>
             <a:endParaRPr lang="pt-BR"/>
           </a:p>
@@ -2402,7 +2398,7 @@
           <a:p>
             <a:fld id="{AAA6B9FE-EE70-444C-8828-DB5DEA8E017A}" type="slidenum">
               <a:rPr lang="pt-BR" smtClean="0"/>
-              <a:t>‹#›</a:t>
+              <a:t>‹nº›</a:t>
             </a:fld>
             <a:endParaRPr lang="pt-BR"/>
           </a:p>
@@ -2573,7 +2569,7 @@
           <a:p>
             <a:fld id="{A5BAA33C-0785-4A1B-865C-67CE1AB5BD5D}" type="datetimeFigureOut">
               <a:rPr lang="pt-BR" smtClean="0"/>
-              <a:t>09/08/2018</a:t>
+              <a:t>17/07/2019</a:t>
             </a:fld>
             <a:endParaRPr lang="pt-BR"/>
           </a:p>
@@ -2651,7 +2647,7 @@
           <a:p>
             <a:fld id="{AAA6B9FE-EE70-444C-8828-DB5DEA8E017A}" type="slidenum">
               <a:rPr lang="pt-BR" smtClean="0"/>
-              <a:t>‹#›</a:t>
+              <a:t>‹nº›</a:t>
             </a:fld>
             <a:endParaRPr lang="pt-BR"/>
           </a:p>
@@ -20164,7 +20160,7 @@
         </p:nvCxnSpPr>
         <p:spPr>
           <a:xfrm>
-            <a:off x="1646615" y="2248749"/>
+            <a:off x="1646615" y="2492030"/>
             <a:ext cx="0" cy="327825"/>
           </a:xfrm>
           <a:prstGeom prst="line">
@@ -20213,7 +20209,7 @@
         </p:blipFill>
         <p:spPr>
           <a:xfrm>
-            <a:off x="1269741" y="2076300"/>
+            <a:off x="1269741" y="2302803"/>
             <a:ext cx="708750" cy="236250"/>
           </a:xfrm>
           <a:prstGeom prst="rect">
@@ -20229,7 +20225,7 @@
         </p:nvSpPr>
         <p:spPr>
           <a:xfrm>
-            <a:off x="1096824" y="1676190"/>
+            <a:off x="1096824" y="1877526"/>
             <a:ext cx="1007007" cy="400110"/>
           </a:xfrm>
           <a:prstGeom prst="rect">
@@ -20255,16 +20251,12 @@
           <a:p>
             <a:pPr algn="ctr"/>
             <a:r>
-              <a:rPr lang="pt-BR" sz="1000" dirty="0" smtClean="0">
+              <a:rPr lang="pt-BR" sz="1000" dirty="0">
                 <a:latin typeface="Segoe UI" panose="020B0502040204020203" pitchFamily="34" charset="0"/>
                 <a:cs typeface="Segoe UI" panose="020B0502040204020203" pitchFamily="34" charset="0"/>
               </a:rPr>
               <a:t>Server(Master)</a:t>
             </a:r>
-            <a:endParaRPr lang="pt-BR" sz="1000" dirty="0">
-              <a:latin typeface="Segoe UI" panose="020B0502040204020203" pitchFamily="34" charset="0"/>
-              <a:cs typeface="Segoe UI" panose="020B0502040204020203" pitchFamily="34" charset="0"/>
-            </a:endParaRPr>
           </a:p>
         </p:txBody>
       </p:sp>
@@ -20385,7 +20377,7 @@
         <p:spPr>
           <a:xfrm>
             <a:off x="1753248" y="3651236"/>
-            <a:ext cx="732893" cy="400110"/>
+            <a:ext cx="732893" cy="553998"/>
           </a:xfrm>
           <a:prstGeom prst="rect">
             <a:avLst/>
@@ -20410,22 +20402,28 @@
           <a:p>
             <a:pPr algn="ctr"/>
             <a:r>
-              <a:rPr lang="pt-BR" sz="1000" dirty="0" smtClean="0">
+              <a:rPr lang="pt-BR" sz="1000" dirty="0">
                 <a:latin typeface="Segoe UI" panose="020B0502040204020203" pitchFamily="34" charset="0"/>
                 <a:cs typeface="Segoe UI" panose="020B0502040204020203" pitchFamily="34" charset="0"/>
               </a:rPr>
               <a:t>Processor</a:t>
             </a:r>
-            <a:endParaRPr lang="pt-BR" sz="1000" dirty="0">
-              <a:latin typeface="Segoe UI" panose="020B0502040204020203" pitchFamily="34" charset="0"/>
-              <a:cs typeface="Segoe UI" panose="020B0502040204020203" pitchFamily="34" charset="0"/>
-            </a:endParaRPr>
+          </a:p>
+          <a:p>
+            <a:pPr algn="ctr"/>
+            <a:r>
+              <a:rPr lang="pt-BR" sz="1000" dirty="0">
+                <a:latin typeface="Segoe UI" panose="020B0502040204020203" pitchFamily="34" charset="0"/>
+                <a:cs typeface="Segoe UI" panose="020B0502040204020203" pitchFamily="34" charset="0"/>
+              </a:rPr>
+              <a:t>+</a:t>
+            </a:r>
           </a:p>
         </p:txBody>
       </p:sp>
       <p:pic>
         <p:nvPicPr>
-          <p:cNvPr id="38" name="Picture 37"/>
+          <p:cNvPr id="40" name="Picture 39"/>
           <p:cNvPicPr>
             <a:picLocks noChangeAspect="1"/>
           </p:cNvPicPr>
@@ -20445,36 +20443,6 @@
         </p:blipFill>
         <p:spPr>
           <a:xfrm>
-            <a:off x="1292240" y="2576574"/>
-            <a:ext cx="708750" cy="236250"/>
-          </a:xfrm>
-          <a:prstGeom prst="rect">
-            <a:avLst/>
-          </a:prstGeom>
-        </p:spPr>
-      </p:pic>
-      <p:pic>
-        <p:nvPicPr>
-          <p:cNvPr id="40" name="Picture 39"/>
-          <p:cNvPicPr>
-            <a:picLocks noChangeAspect="1"/>
-          </p:cNvPicPr>
-          <p:nvPr/>
-        </p:nvPicPr>
-        <p:blipFill>
-          <a:blip r:embed="rId3">
-            <a:extLst>
-              <a:ext uri="{28A0092B-C50C-407E-A947-70E740481C1C}">
-                <a14:useLocalDpi xmlns:a14="http://schemas.microsoft.com/office/drawing/2010/main" val="0"/>
-              </a:ext>
-            </a:extLst>
-          </a:blip>
-          <a:stretch>
-            <a:fillRect/>
-          </a:stretch>
-        </p:blipFill>
-        <p:spPr>
-          <a:xfrm>
             <a:off x="2263340" y="2576574"/>
             <a:ext cx="708750" cy="236250"/>
           </a:xfrm>
@@ -20491,8 +20459,8 @@
         </p:nvSpPr>
         <p:spPr>
           <a:xfrm>
-            <a:off x="562107" y="2436490"/>
-            <a:ext cx="787395" cy="400110"/>
+            <a:off x="1471328" y="4107286"/>
+            <a:ext cx="1285928" cy="400110"/>
           </a:xfrm>
           <a:prstGeom prst="rect">
             <a:avLst/>
@@ -20517,16 +20485,12 @@
           <a:p>
             <a:pPr algn="ctr"/>
             <a:r>
-              <a:rPr lang="pt-BR" sz="1000" dirty="0" smtClean="0">
+              <a:rPr lang="pt-BR" sz="1000" dirty="0">
                 <a:latin typeface="Segoe UI" panose="020B0502040204020203" pitchFamily="34" charset="0"/>
                 <a:cs typeface="Segoe UI" panose="020B0502040204020203" pitchFamily="34" charset="0"/>
               </a:rPr>
-              <a:t>Webserver</a:t>
-            </a:r>
-            <a:endParaRPr lang="pt-BR" sz="1000" dirty="0">
-              <a:latin typeface="Segoe UI" panose="020B0502040204020203" pitchFamily="34" charset="0"/>
-              <a:cs typeface="Segoe UI" panose="020B0502040204020203" pitchFamily="34" charset="0"/>
-            </a:endParaRPr>
+              <a:t>Webserver (master)</a:t>
+            </a:r>
           </a:p>
         </p:txBody>
       </p:sp>
@@ -20564,16 +20528,12 @@
           <a:p>
             <a:pPr algn="ctr"/>
             <a:r>
-              <a:rPr lang="pt-BR" sz="1000" dirty="0" smtClean="0">
+              <a:rPr lang="pt-BR" sz="1000" dirty="0">
                 <a:latin typeface="Segoe UI" panose="020B0502040204020203" pitchFamily="34" charset="0"/>
                 <a:cs typeface="Segoe UI" panose="020B0502040204020203" pitchFamily="34" charset="0"/>
               </a:rPr>
               <a:t>Webserver</a:t>
             </a:r>
-            <a:endParaRPr lang="pt-BR" sz="1000" dirty="0">
-              <a:latin typeface="Segoe UI" panose="020B0502040204020203" pitchFamily="34" charset="0"/>
-              <a:cs typeface="Segoe UI" panose="020B0502040204020203" pitchFamily="34" charset="0"/>
-            </a:endParaRPr>
           </a:p>
         </p:txBody>
       </p:sp>
@@ -20739,7 +20699,7 @@
         </p:blipFill>
         <p:spPr>
           <a:xfrm>
-            <a:off x="1764740" y="3468472"/>
+            <a:off x="1777391" y="3441729"/>
             <a:ext cx="708750" cy="236250"/>
           </a:xfrm>
           <a:prstGeom prst="rect">
@@ -20770,7 +20730,7 @@
           <a:lstStyle/>
           <a:p>
             <a:r>
-              <a:rPr lang="pt-BR" dirty="0" smtClean="0"/>
+              <a:rPr lang="pt-BR" dirty="0"/>
               <a:t>Exemplo de arquitetura com dois EPM Server e um EPM Processor</a:t>
             </a:r>
           </a:p>
@@ -20784,7 +20744,7 @@
         </p:nvCxnSpPr>
         <p:spPr>
           <a:xfrm>
-            <a:off x="5736015" y="2299549"/>
+            <a:off x="5736015" y="2551219"/>
             <a:ext cx="0" cy="327825"/>
           </a:xfrm>
           <a:prstGeom prst="line">
@@ -20833,7 +20793,7 @@
         </p:blipFill>
         <p:spPr>
           <a:xfrm>
-            <a:off x="5359141" y="2127100"/>
+            <a:off x="5359141" y="2328436"/>
             <a:ext cx="708750" cy="236250"/>
           </a:xfrm>
           <a:prstGeom prst="rect">
@@ -20849,7 +20809,7 @@
         </p:nvSpPr>
         <p:spPr>
           <a:xfrm>
-            <a:off x="5186224" y="1726990"/>
+            <a:off x="5194444" y="1935223"/>
             <a:ext cx="1007007" cy="400110"/>
           </a:xfrm>
           <a:prstGeom prst="rect">
@@ -20875,16 +20835,12 @@
           <a:p>
             <a:pPr algn="ctr"/>
             <a:r>
-              <a:rPr lang="pt-BR" sz="1000" dirty="0" smtClean="0">
+              <a:rPr lang="pt-BR" sz="1000" dirty="0">
                 <a:latin typeface="Segoe UI" panose="020B0502040204020203" pitchFamily="34" charset="0"/>
                 <a:cs typeface="Segoe UI" panose="020B0502040204020203" pitchFamily="34" charset="0"/>
               </a:rPr>
               <a:t>Server(Master)</a:t>
             </a:r>
-            <a:endParaRPr lang="pt-BR" sz="1000" dirty="0">
-              <a:latin typeface="Segoe UI" panose="020B0502040204020203" pitchFamily="34" charset="0"/>
-              <a:cs typeface="Segoe UI" panose="020B0502040204020203" pitchFamily="34" charset="0"/>
-            </a:endParaRPr>
           </a:p>
         </p:txBody>
       </p:sp>
@@ -20932,7 +20888,7 @@
         <p:spPr>
           <a:xfrm>
             <a:off x="5369568" y="3715795"/>
-            <a:ext cx="732893" cy="400110"/>
+            <a:ext cx="732893" cy="553998"/>
           </a:xfrm>
           <a:prstGeom prst="rect">
             <a:avLst/>
@@ -20957,49 +20913,25 @@
           <a:p>
             <a:pPr algn="ctr"/>
             <a:r>
-              <a:rPr lang="pt-BR" sz="1000" dirty="0" smtClean="0">
+              <a:rPr lang="pt-BR" sz="1000" dirty="0">
                 <a:latin typeface="Segoe UI" panose="020B0502040204020203" pitchFamily="34" charset="0"/>
                 <a:cs typeface="Segoe UI" panose="020B0502040204020203" pitchFamily="34" charset="0"/>
               </a:rPr>
               <a:t>Processor</a:t>
             </a:r>
-            <a:endParaRPr lang="pt-BR" sz="1000" dirty="0">
-              <a:latin typeface="Segoe UI" panose="020B0502040204020203" pitchFamily="34" charset="0"/>
-              <a:cs typeface="Segoe UI" panose="020B0502040204020203" pitchFamily="34" charset="0"/>
-            </a:endParaRPr>
+          </a:p>
+          <a:p>
+            <a:pPr algn="ctr"/>
+            <a:r>
+              <a:rPr lang="pt-BR" sz="1000" dirty="0">
+                <a:latin typeface="Segoe UI" panose="020B0502040204020203" pitchFamily="34" charset="0"/>
+                <a:cs typeface="Segoe UI" panose="020B0502040204020203" pitchFamily="34" charset="0"/>
+              </a:rPr>
+              <a:t>+</a:t>
+            </a:r>
           </a:p>
         </p:txBody>
       </p:sp>
-      <p:pic>
-        <p:nvPicPr>
-          <p:cNvPr id="78" name="Picture 77"/>
-          <p:cNvPicPr>
-            <a:picLocks noChangeAspect="1"/>
-          </p:cNvPicPr>
-          <p:nvPr/>
-        </p:nvPicPr>
-        <p:blipFill>
-          <a:blip r:embed="rId3">
-            <a:extLst>
-              <a:ext uri="{28A0092B-C50C-407E-A947-70E740481C1C}">
-                <a14:useLocalDpi xmlns:a14="http://schemas.microsoft.com/office/drawing/2010/main" val="0"/>
-              </a:ext>
-            </a:extLst>
-          </a:blip>
-          <a:stretch>
-            <a:fillRect/>
-          </a:stretch>
-        </p:blipFill>
-        <p:spPr>
-          <a:xfrm>
-            <a:off x="5381640" y="2627374"/>
-            <a:ext cx="708750" cy="236250"/>
-          </a:xfrm>
-          <a:prstGeom prst="rect">
-            <a:avLst/>
-          </a:prstGeom>
-        </p:spPr>
-      </p:pic>
       <p:sp>
         <p:nvSpPr>
           <p:cNvPr id="80" name="TextBox 79"/>
@@ -21008,7 +20940,7 @@
         </p:nvSpPr>
         <p:spPr>
           <a:xfrm>
-            <a:off x="4651507" y="2487290"/>
+            <a:off x="5359144" y="4205234"/>
             <a:ext cx="787395" cy="400110"/>
           </a:xfrm>
           <a:prstGeom prst="rect">
@@ -21034,16 +20966,12 @@
           <a:p>
             <a:pPr algn="ctr"/>
             <a:r>
-              <a:rPr lang="pt-BR" sz="1000" dirty="0" smtClean="0">
+              <a:rPr lang="pt-BR" sz="1000" dirty="0">
                 <a:latin typeface="Segoe UI" panose="020B0502040204020203" pitchFamily="34" charset="0"/>
                 <a:cs typeface="Segoe UI" panose="020B0502040204020203" pitchFamily="34" charset="0"/>
               </a:rPr>
               <a:t>Webserver</a:t>
             </a:r>
-            <a:endParaRPr lang="pt-BR" sz="1000" dirty="0">
-              <a:latin typeface="Segoe UI" panose="020B0502040204020203" pitchFamily="34" charset="0"/>
-              <a:cs typeface="Segoe UI" panose="020B0502040204020203" pitchFamily="34" charset="0"/>
-            </a:endParaRPr>
           </a:p>
         </p:txBody>
       </p:sp>
@@ -21191,7 +21119,7 @@
         <p:spPr>
           <a:xfrm>
             <a:off x="6372868" y="3715795"/>
-            <a:ext cx="732893" cy="400110"/>
+            <a:ext cx="732893" cy="553998"/>
           </a:xfrm>
           <a:prstGeom prst="rect">
             <a:avLst/>
@@ -21216,16 +21144,22 @@
           <a:p>
             <a:pPr algn="ctr"/>
             <a:r>
-              <a:rPr lang="pt-BR" sz="1000" dirty="0" smtClean="0">
+              <a:rPr lang="pt-BR" sz="1000" dirty="0">
                 <a:latin typeface="Segoe UI" panose="020B0502040204020203" pitchFamily="34" charset="0"/>
                 <a:cs typeface="Segoe UI" panose="020B0502040204020203" pitchFamily="34" charset="0"/>
               </a:rPr>
               <a:t>Processor</a:t>
             </a:r>
-            <a:endParaRPr lang="pt-BR" sz="1000" dirty="0">
-              <a:latin typeface="Segoe UI" panose="020B0502040204020203" pitchFamily="34" charset="0"/>
-              <a:cs typeface="Segoe UI" panose="020B0502040204020203" pitchFamily="34" charset="0"/>
-            </a:endParaRPr>
+          </a:p>
+          <a:p>
+            <a:pPr algn="ctr"/>
+            <a:r>
+              <a:rPr lang="pt-BR" sz="1000" dirty="0">
+                <a:latin typeface="Segoe UI" panose="020B0502040204020203" pitchFamily="34" charset="0"/>
+                <a:cs typeface="Segoe UI" panose="020B0502040204020203" pitchFamily="34" charset="0"/>
+              </a:rPr>
+              <a:t>+</a:t>
+            </a:r>
           </a:p>
         </p:txBody>
       </p:sp>
@@ -21317,8 +21251,57 @@
           <a:lstStyle/>
           <a:p>
             <a:r>
-              <a:rPr lang="pt-BR" dirty="0" smtClean="0"/>
+              <a:rPr lang="pt-BR" dirty="0"/>
               <a:t>Exemplo de arquitetura com um EPM Server e dois EPM Processor</a:t>
+            </a:r>
+          </a:p>
+        </p:txBody>
+      </p:sp>
+      <p:sp>
+        <p:nvSpPr>
+          <p:cNvPr id="36" name="TextBox 79">
+            <a:extLst>
+              <a:ext uri="{FF2B5EF4-FFF2-40B4-BE49-F238E27FC236}">
+                <a16:creationId xmlns:a16="http://schemas.microsoft.com/office/drawing/2014/main" id="{45B66B05-801F-4C52-981F-8A6CA44D5445}"/>
+              </a:ext>
+            </a:extLst>
+          </p:cNvPr>
+          <p:cNvSpPr txBox="1"/>
+          <p:nvPr/>
+        </p:nvSpPr>
+        <p:spPr>
+          <a:xfrm>
+            <a:off x="6345616" y="4205234"/>
+            <a:ext cx="787395" cy="400110"/>
+          </a:xfrm>
+          <a:prstGeom prst="rect">
+            <a:avLst/>
+          </a:prstGeom>
+          <a:noFill/>
+        </p:spPr>
+        <p:txBody>
+          <a:bodyPr wrap="none" rtlCol="0">
+            <a:spAutoFit/>
+          </a:bodyPr>
+          <a:lstStyle/>
+          <a:p>
+            <a:pPr algn="ctr"/>
+            <a:r>
+              <a:rPr lang="pt-BR" sz="1000" dirty="0">
+                <a:latin typeface="Segoe UI" panose="020B0502040204020203" pitchFamily="34" charset="0"/>
+                <a:cs typeface="Segoe UI" panose="020B0502040204020203" pitchFamily="34" charset="0"/>
+              </a:rPr>
+              <a:t>EPM</a:t>
+            </a:r>
+          </a:p>
+          <a:p>
+            <a:pPr algn="ctr"/>
+            <a:r>
+              <a:rPr lang="pt-BR" sz="1000" dirty="0">
+                <a:latin typeface="Segoe UI" panose="020B0502040204020203" pitchFamily="34" charset="0"/>
+                <a:cs typeface="Segoe UI" panose="020B0502040204020203" pitchFamily="34" charset="0"/>
+              </a:rPr>
+              <a:t>Webserver</a:t>
             </a:r>
           </a:p>
         </p:txBody>
@@ -21598,90 +21581,15 @@
 </file>
 
 <file path=customXml/item1.xml><?xml version="1.0" encoding="utf-8"?>
-<p:properties xmlns:p="http://schemas.microsoft.com/office/2006/metadata/properties" xmlns:xsi="http://www.w3.org/2001/XMLSchema-instance" xmlns:pc="http://schemas.microsoft.com/office/infopath/2007/PartnerControls">
-  <documentManagement>
-    <TaskGroup xmlns="http://schemas.microsoft.com/sharepoint/v3">
-      <UserInfo>
-        <DisplayName/>
-        <AccountId xsi:nil="true"/>
-        <AccountType/>
-      </UserInfo>
-    </TaskGroup>
-    <Frame_x0020_Count xmlns="e9bb39ac-ea54-4350-abd5-7ff991ff1845" xsi:nil="true"/>
-    <F-Number xmlns="e9bb39ac-ea54-4350-abd5-7ff991ff1845" xsi:nil="true"/>
-    <Stream_x0020_name xmlns="e9bb39ac-ea54-4350-abd5-7ff991ff1845" xsi:nil="true"/>
-    <Sample_x0020_Rate xmlns="e9bb39ac-ea54-4350-abd5-7ff991ff1845" xsi:nil="true"/>
-    <Year xmlns="e9bb39ac-ea54-4350-abd5-7ff991ff1845" xsi:nil="true"/>
-    <Artist xmlns="e9bb39ac-ea54-4350-abd5-7ff991ff1845" xsi:nil="true"/>
-    <Width xmlns="e9bb39ac-ea54-4350-abd5-7ff991ff1845" xsi:nil="true"/>
-    <_dlc_DocId xmlns="e9bb39ac-ea54-4350-abd5-7ff991ff1845">M4TWK6UF55AS-8-213</_dlc_DocId>
-    <Camera_x0020_Model xmlns="e9bb39ac-ea54-4350-abd5-7ff991ff1845" xsi:nil="true"/>
-    <_dlc_DocIdUrl xmlns="e9bb39ac-ea54-4350-abd5-7ff991ff1845">
-      <Url>http://portal.elipse.com.br/_layouts/DocIdRedir.aspx?ID=M4TWK6UF55AS-8-213</Url>
-      <Description>M4TWK6UF55AS-8-213</Description>
-    </_dlc_DocIdUrl>
-    <Bit_x0020_Depth xmlns="e9bb39ac-ea54-4350-abd5-7ff991ff1845" xsi:nil="true"/>
-    <Company xmlns="http://schemas.microsoft.com/sharepoint/v3" xsi:nil="true"/>
-    <Color_x0020_Representation xmlns="e9bb39ac-ea54-4350-abd5-7ff991ff1845" xsi:nil="true"/>
-    <Track_x0020_Number xmlns="e9bb39ac-ea54-4350-abd5-7ff991ff1845" xsi:nil="true"/>
-    <Bit_x0020_Rate xmlns="e9bb39ac-ea54-4350-abd5-7ff991ff1845" xsi:nil="true"/>
-    <Focal_x0020_Length xmlns="e9bb39ac-ea54-4350-abd5-7ff991ff1845" xsi:nil="true"/>
-    <Album_x0020_Title xmlns="e9bb39ac-ea54-4350-abd5-7ff991ff1845" xsi:nil="true"/>
-    <Resolution xmlns="e9bb39ac-ea54-4350-abd5-7ff991ff1845" xsi:nil="true"/>
-    <Exposure_x0020_Time xmlns="e9bb39ac-ea54-4350-abd5-7ff991ff1845" xsi:nil="true"/>
-    <Channels xmlns="e9bb39ac-ea54-4350-abd5-7ff991ff1845" xsi:nil="true"/>
-    <Height xmlns="e9bb39ac-ea54-4350-abd5-7ff991ff1845" xsi:nil="true"/>
-  </documentManagement>
-</p:properties>
+<?mso-contentType ?>
+<FormTemplates xmlns="http://schemas.microsoft.com/sharepoint/v3/contenttype/forms">
+  <Display>DocumentLibraryForm</Display>
+  <Edit>DocumentLibraryForm</Edit>
+  <New>DocumentLibraryForm</New>
+</FormTemplates>
 </file>
 
 <file path=customXml/item2.xml><?xml version="1.0" encoding="utf-8"?>
-<?mso-contentType ?>
-<spe:Receivers xmlns:spe="http://schemas.microsoft.com/sharepoint/events">
-  <Receiver>
-    <Name>Document ID Generator</Name>
-    <Synchronization>Synchronous</Synchronization>
-    <Type>10001</Type>
-    <SequenceNumber>1000</SequenceNumber>
-    <Assembly>Microsoft.Office.DocumentManagement, Version=14.0.0.0, Culture=neutral, PublicKeyToken=71e9bce111e9429c</Assembly>
-    <Class>Microsoft.Office.DocumentManagement.Internal.DocIdHandler</Class>
-    <Data/>
-    <Filter/>
-  </Receiver>
-  <Receiver>
-    <Name>Document ID Generator</Name>
-    <Synchronization>Synchronous</Synchronization>
-    <Type>10002</Type>
-    <SequenceNumber>1001</SequenceNumber>
-    <Assembly>Microsoft.Office.DocumentManagement, Version=14.0.0.0, Culture=neutral, PublicKeyToken=71e9bce111e9429c</Assembly>
-    <Class>Microsoft.Office.DocumentManagement.Internal.DocIdHandler</Class>
-    <Data/>
-    <Filter/>
-  </Receiver>
-  <Receiver>
-    <Name>Document ID Generator</Name>
-    <Synchronization>Synchronous</Synchronization>
-    <Type>10004</Type>
-    <SequenceNumber>1002</SequenceNumber>
-    <Assembly>Microsoft.Office.DocumentManagement, Version=14.0.0.0, Culture=neutral, PublicKeyToken=71e9bce111e9429c</Assembly>
-    <Class>Microsoft.Office.DocumentManagement.Internal.DocIdHandler</Class>
-    <Data/>
-    <Filter/>
-  </Receiver>
-  <Receiver>
-    <Name>Document ID Generator</Name>
-    <Synchronization>Synchronous</Synchronization>
-    <Type>10006</Type>
-    <SequenceNumber>1003</SequenceNumber>
-    <Assembly>Microsoft.Office.DocumentManagement, Version=14.0.0.0, Culture=neutral, PublicKeyToken=71e9bce111e9429c</Assembly>
-    <Class>Microsoft.Office.DocumentManagement.Internal.DocIdHandler</Class>
-    <Data/>
-    <Filter/>
-  </Receiver>
-</spe:Receivers>
-</file>
-
-<file path=customXml/item3.xml><?xml version="1.0" encoding="utf-8"?>
 <ct:contentTypeSchema xmlns:ct="http://schemas.microsoft.com/office/2006/metadata/contentType" xmlns:ma="http://schemas.microsoft.com/office/2006/metadata/properties/metaAttributes" ct:_="" ma:_="" ma:contentTypeName="Document" ma:contentTypeID="0x0101007D549BFAFE8E5F43880CAFE2D5CAA55D" ma:contentTypeVersion="24" ma:contentTypeDescription="Create a new document." ma:contentTypeScope="" ma:versionID="cabd65ca1e2131974802f0dec5e19bb9">
   <xsd:schema xmlns:xsd="http://www.w3.org/2001/XMLSchema" xmlns:xs="http://www.w3.org/2001/XMLSchema" xmlns:p="http://schemas.microsoft.com/office/2006/metadata/properties" xmlns:ns1="http://schemas.microsoft.com/sharepoint/v3" xmlns:ns3="e9bb39ac-ea54-4350-abd5-7ff991ff1845" targetNamespace="http://schemas.microsoft.com/office/2006/metadata/properties" ma:root="true" ma:fieldsID="3ecabbdfa91c3905e83a2b97aa6757db" ns1:_="" ns3:_="">
     <xsd:import namespace="http://schemas.microsoft.com/sharepoint/v3"/>
@@ -22002,41 +21910,99 @@
 </ct:contentTypeSchema>
 </file>
 
+<file path=customXml/item3.xml><?xml version="1.0" encoding="utf-8"?>
+<?mso-contentType ?>
+<spe:Receivers xmlns:spe="http://schemas.microsoft.com/sharepoint/events">
+  <Receiver>
+    <Name>Document ID Generator</Name>
+    <Synchronization>Synchronous</Synchronization>
+    <Type>10001</Type>
+    <SequenceNumber>1000</SequenceNumber>
+    <Assembly>Microsoft.Office.DocumentManagement, Version=14.0.0.0, Culture=neutral, PublicKeyToken=71e9bce111e9429c</Assembly>
+    <Class>Microsoft.Office.DocumentManagement.Internal.DocIdHandler</Class>
+    <Data/>
+    <Filter/>
+  </Receiver>
+  <Receiver>
+    <Name>Document ID Generator</Name>
+    <Synchronization>Synchronous</Synchronization>
+    <Type>10002</Type>
+    <SequenceNumber>1001</SequenceNumber>
+    <Assembly>Microsoft.Office.DocumentManagement, Version=14.0.0.0, Culture=neutral, PublicKeyToken=71e9bce111e9429c</Assembly>
+    <Class>Microsoft.Office.DocumentManagement.Internal.DocIdHandler</Class>
+    <Data/>
+    <Filter/>
+  </Receiver>
+  <Receiver>
+    <Name>Document ID Generator</Name>
+    <Synchronization>Synchronous</Synchronization>
+    <Type>10004</Type>
+    <SequenceNumber>1002</SequenceNumber>
+    <Assembly>Microsoft.Office.DocumentManagement, Version=14.0.0.0, Culture=neutral, PublicKeyToken=71e9bce111e9429c</Assembly>
+    <Class>Microsoft.Office.DocumentManagement.Internal.DocIdHandler</Class>
+    <Data/>
+    <Filter/>
+  </Receiver>
+  <Receiver>
+    <Name>Document ID Generator</Name>
+    <Synchronization>Synchronous</Synchronization>
+    <Type>10006</Type>
+    <SequenceNumber>1003</SequenceNumber>
+    <Assembly>Microsoft.Office.DocumentManagement, Version=14.0.0.0, Culture=neutral, PublicKeyToken=71e9bce111e9429c</Assembly>
+    <Class>Microsoft.Office.DocumentManagement.Internal.DocIdHandler</Class>
+    <Data/>
+    <Filter/>
+  </Receiver>
+</spe:Receivers>
+</file>
+
 <file path=customXml/item4.xml><?xml version="1.0" encoding="utf-8"?>
-<?mso-contentType ?>
-<FormTemplates xmlns="http://schemas.microsoft.com/sharepoint/v3/contenttype/forms">
-  <Display>DocumentLibraryForm</Display>
-  <Edit>DocumentLibraryForm</Edit>
-  <New>DocumentLibraryForm</New>
-</FormTemplates>
+<p:properties xmlns:p="http://schemas.microsoft.com/office/2006/metadata/properties" xmlns:xsi="http://www.w3.org/2001/XMLSchema-instance" xmlns:pc="http://schemas.microsoft.com/office/infopath/2007/PartnerControls">
+  <documentManagement>
+    <TaskGroup xmlns="http://schemas.microsoft.com/sharepoint/v3">
+      <UserInfo>
+        <DisplayName/>
+        <AccountId xsi:nil="true"/>
+        <AccountType/>
+      </UserInfo>
+    </TaskGroup>
+    <Frame_x0020_Count xmlns="e9bb39ac-ea54-4350-abd5-7ff991ff1845" xsi:nil="true"/>
+    <F-Number xmlns="e9bb39ac-ea54-4350-abd5-7ff991ff1845" xsi:nil="true"/>
+    <Stream_x0020_name xmlns="e9bb39ac-ea54-4350-abd5-7ff991ff1845" xsi:nil="true"/>
+    <Sample_x0020_Rate xmlns="e9bb39ac-ea54-4350-abd5-7ff991ff1845" xsi:nil="true"/>
+    <Year xmlns="e9bb39ac-ea54-4350-abd5-7ff991ff1845" xsi:nil="true"/>
+    <Artist xmlns="e9bb39ac-ea54-4350-abd5-7ff991ff1845" xsi:nil="true"/>
+    <Width xmlns="e9bb39ac-ea54-4350-abd5-7ff991ff1845" xsi:nil="true"/>
+    <_dlc_DocId xmlns="e9bb39ac-ea54-4350-abd5-7ff991ff1845">M4TWK6UF55AS-8-213</_dlc_DocId>
+    <Camera_x0020_Model xmlns="e9bb39ac-ea54-4350-abd5-7ff991ff1845" xsi:nil="true"/>
+    <_dlc_DocIdUrl xmlns="e9bb39ac-ea54-4350-abd5-7ff991ff1845">
+      <Url>http://portal.elipse.com.br/_layouts/DocIdRedir.aspx?ID=M4TWK6UF55AS-8-213</Url>
+      <Description>M4TWK6UF55AS-8-213</Description>
+    </_dlc_DocIdUrl>
+    <Bit_x0020_Depth xmlns="e9bb39ac-ea54-4350-abd5-7ff991ff1845" xsi:nil="true"/>
+    <Company xmlns="http://schemas.microsoft.com/sharepoint/v3" xsi:nil="true"/>
+    <Color_x0020_Representation xmlns="e9bb39ac-ea54-4350-abd5-7ff991ff1845" xsi:nil="true"/>
+    <Track_x0020_Number xmlns="e9bb39ac-ea54-4350-abd5-7ff991ff1845" xsi:nil="true"/>
+    <Bit_x0020_Rate xmlns="e9bb39ac-ea54-4350-abd5-7ff991ff1845" xsi:nil="true"/>
+    <Focal_x0020_Length xmlns="e9bb39ac-ea54-4350-abd5-7ff991ff1845" xsi:nil="true"/>
+    <Album_x0020_Title xmlns="e9bb39ac-ea54-4350-abd5-7ff991ff1845" xsi:nil="true"/>
+    <Resolution xmlns="e9bb39ac-ea54-4350-abd5-7ff991ff1845" xsi:nil="true"/>
+    <Exposure_x0020_Time xmlns="e9bb39ac-ea54-4350-abd5-7ff991ff1845" xsi:nil="true"/>
+    <Channels xmlns="e9bb39ac-ea54-4350-abd5-7ff991ff1845" xsi:nil="true"/>
+    <Height xmlns="e9bb39ac-ea54-4350-abd5-7ff991ff1845" xsi:nil="true"/>
+  </documentManagement>
+</p:properties>
 </file>
 
 <file path=customXml/itemProps1.xml><?xml version="1.0" encoding="utf-8"?>
-<ds:datastoreItem xmlns:ds="http://schemas.openxmlformats.org/officeDocument/2006/customXml" ds:itemID="{8932599B-802B-4437-A488-9CBA2113F6A6}">
+<ds:datastoreItem xmlns:ds="http://schemas.openxmlformats.org/officeDocument/2006/customXml" ds:itemID="{41EE2097-F55F-4F9F-AF8F-F2949B171E16}">
   <ds:schemaRefs>
-    <ds:schemaRef ds:uri="http://schemas.microsoft.com/office/2006/documentManagement/types"/>
-    <ds:schemaRef ds:uri="http://schemas.microsoft.com/office/infopath/2007/PartnerControls"/>
-    <ds:schemaRef ds:uri="http://www.w3.org/XML/1998/namespace"/>
-    <ds:schemaRef ds:uri="http://purl.org/dc/dcmitype/"/>
-    <ds:schemaRef ds:uri="http://purl.org/dc/terms/"/>
-    <ds:schemaRef ds:uri="http://schemas.openxmlformats.org/package/2006/metadata/core-properties"/>
-    <ds:schemaRef ds:uri="http://purl.org/dc/elements/1.1/"/>
-    <ds:schemaRef ds:uri="e9bb39ac-ea54-4350-abd5-7ff991ff1845"/>
-    <ds:schemaRef ds:uri="http://schemas.microsoft.com/sharepoint/v3"/>
-    <ds:schemaRef ds:uri="http://schemas.microsoft.com/office/2006/metadata/properties"/>
+    <ds:schemaRef ds:uri="http://schemas.microsoft.com/sharepoint/v3/contenttype/forms"/>
   </ds:schemaRefs>
 </ds:datastoreItem>
 </file>
 
 <file path=customXml/itemProps2.xml><?xml version="1.0" encoding="utf-8"?>
-<ds:datastoreItem xmlns:ds="http://schemas.openxmlformats.org/officeDocument/2006/customXml" ds:itemID="{42C0714E-021E-409A-8446-9B043BB90BFA}">
-  <ds:schemaRefs>
-    <ds:schemaRef ds:uri="http://schemas.microsoft.com/sharepoint/events"/>
-  </ds:schemaRefs>
-</ds:datastoreItem>
-</file>
-
-<file path=customXml/itemProps3.xml><?xml version="1.0" encoding="utf-8"?>
 <ds:datastoreItem xmlns:ds="http://schemas.openxmlformats.org/officeDocument/2006/customXml" ds:itemID="{D8E893AA-B4E1-4939-8F13-2DEC81ADF64A}">
   <ds:schemaRefs>
     <ds:schemaRef ds:uri="http://schemas.microsoft.com/office/2006/metadata/contentType"/>
@@ -22055,10 +22021,27 @@
 </ds:datastoreItem>
 </file>
 
+<file path=customXml/itemProps3.xml><?xml version="1.0" encoding="utf-8"?>
+<ds:datastoreItem xmlns:ds="http://schemas.openxmlformats.org/officeDocument/2006/customXml" ds:itemID="{42C0714E-021E-409A-8446-9B043BB90BFA}">
+  <ds:schemaRefs>
+    <ds:schemaRef ds:uri="http://schemas.microsoft.com/sharepoint/events"/>
+  </ds:schemaRefs>
+</ds:datastoreItem>
+</file>
+
 <file path=customXml/itemProps4.xml><?xml version="1.0" encoding="utf-8"?>
-<ds:datastoreItem xmlns:ds="http://schemas.openxmlformats.org/officeDocument/2006/customXml" ds:itemID="{41EE2097-F55F-4F9F-AF8F-F2949B171E16}">
+<ds:datastoreItem xmlns:ds="http://schemas.openxmlformats.org/officeDocument/2006/customXml" ds:itemID="{8932599B-802B-4437-A488-9CBA2113F6A6}">
   <ds:schemaRefs>
-    <ds:schemaRef ds:uri="http://schemas.microsoft.com/sharepoint/v3/contenttype/forms"/>
+    <ds:schemaRef ds:uri="http://schemas.microsoft.com/office/2006/documentManagement/types"/>
+    <ds:schemaRef ds:uri="http://schemas.microsoft.com/office/infopath/2007/PartnerControls"/>
+    <ds:schemaRef ds:uri="http://www.w3.org/XML/1998/namespace"/>
+    <ds:schemaRef ds:uri="http://purl.org/dc/dcmitype/"/>
+    <ds:schemaRef ds:uri="http://purl.org/dc/terms/"/>
+    <ds:schemaRef ds:uri="http://schemas.openxmlformats.org/package/2006/metadata/core-properties"/>
+    <ds:schemaRef ds:uri="http://purl.org/dc/elements/1.1/"/>
+    <ds:schemaRef ds:uri="e9bb39ac-ea54-4350-abd5-7ff991ff1845"/>
+    <ds:schemaRef ds:uri="http://schemas.microsoft.com/sharepoint/v3"/>
+    <ds:schemaRef ds:uri="http://schemas.microsoft.com/office/2006/metadata/properties"/>
   </ds:schemaRefs>
 </ds:datastoreItem>
 </file>
</xml_diff>

<commit_message>
Atualização de imagem relacionada ao CGI do IIS
</commit_message>
<xml_diff>
--- a/guiadousuario/images/Network Architecture 2D - EPM Processor.pptx
+++ b/guiadousuario/images/Network Architecture 2D - EPM Processor.pptx
@@ -248,7 +248,7 @@
           <a:p>
             <a:fld id="{A5BAA33C-0785-4A1B-865C-67CE1AB5BD5D}" type="datetimeFigureOut">
               <a:rPr lang="pt-BR" smtClean="0"/>
-              <a:t>17/07/2019</a:t>
+              <a:t>30/07/2019</a:t>
             </a:fld>
             <a:endParaRPr lang="pt-BR"/>
           </a:p>
@@ -418,7 +418,7 @@
           <a:p>
             <a:fld id="{A5BAA33C-0785-4A1B-865C-67CE1AB5BD5D}" type="datetimeFigureOut">
               <a:rPr lang="pt-BR" smtClean="0"/>
-              <a:t>17/07/2019</a:t>
+              <a:t>30/07/2019</a:t>
             </a:fld>
             <a:endParaRPr lang="pt-BR"/>
           </a:p>
@@ -598,7 +598,7 @@
           <a:p>
             <a:fld id="{A5BAA33C-0785-4A1B-865C-67CE1AB5BD5D}" type="datetimeFigureOut">
               <a:rPr lang="pt-BR" smtClean="0"/>
-              <a:t>17/07/2019</a:t>
+              <a:t>30/07/2019</a:t>
             </a:fld>
             <a:endParaRPr lang="pt-BR"/>
           </a:p>
@@ -768,7 +768,7 @@
           <a:p>
             <a:fld id="{A5BAA33C-0785-4A1B-865C-67CE1AB5BD5D}" type="datetimeFigureOut">
               <a:rPr lang="pt-BR" smtClean="0"/>
-              <a:t>17/07/2019</a:t>
+              <a:t>30/07/2019</a:t>
             </a:fld>
             <a:endParaRPr lang="pt-BR"/>
           </a:p>
@@ -1014,7 +1014,7 @@
           <a:p>
             <a:fld id="{A5BAA33C-0785-4A1B-865C-67CE1AB5BD5D}" type="datetimeFigureOut">
               <a:rPr lang="pt-BR" smtClean="0"/>
-              <a:t>17/07/2019</a:t>
+              <a:t>30/07/2019</a:t>
             </a:fld>
             <a:endParaRPr lang="pt-BR"/>
           </a:p>
@@ -1246,7 +1246,7 @@
           <a:p>
             <a:fld id="{A5BAA33C-0785-4A1B-865C-67CE1AB5BD5D}" type="datetimeFigureOut">
               <a:rPr lang="pt-BR" smtClean="0"/>
-              <a:t>17/07/2019</a:t>
+              <a:t>30/07/2019</a:t>
             </a:fld>
             <a:endParaRPr lang="pt-BR"/>
           </a:p>
@@ -1613,7 +1613,7 @@
           <a:p>
             <a:fld id="{A5BAA33C-0785-4A1B-865C-67CE1AB5BD5D}" type="datetimeFigureOut">
               <a:rPr lang="pt-BR" smtClean="0"/>
-              <a:t>17/07/2019</a:t>
+              <a:t>30/07/2019</a:t>
             </a:fld>
             <a:endParaRPr lang="pt-BR"/>
           </a:p>
@@ -1731,7 +1731,7 @@
           <a:p>
             <a:fld id="{A5BAA33C-0785-4A1B-865C-67CE1AB5BD5D}" type="datetimeFigureOut">
               <a:rPr lang="pt-BR" smtClean="0"/>
-              <a:t>17/07/2019</a:t>
+              <a:t>30/07/2019</a:t>
             </a:fld>
             <a:endParaRPr lang="pt-BR"/>
           </a:p>
@@ -1826,7 +1826,7 @@
           <a:p>
             <a:fld id="{A5BAA33C-0785-4A1B-865C-67CE1AB5BD5D}" type="datetimeFigureOut">
               <a:rPr lang="pt-BR" smtClean="0"/>
-              <a:t>17/07/2019</a:t>
+              <a:t>30/07/2019</a:t>
             </a:fld>
             <a:endParaRPr lang="pt-BR"/>
           </a:p>
@@ -2103,7 +2103,7 @@
           <a:p>
             <a:fld id="{A5BAA33C-0785-4A1B-865C-67CE1AB5BD5D}" type="datetimeFigureOut">
               <a:rPr lang="pt-BR" smtClean="0"/>
-              <a:t>17/07/2019</a:t>
+              <a:t>30/07/2019</a:t>
             </a:fld>
             <a:endParaRPr lang="pt-BR"/>
           </a:p>
@@ -2356,7 +2356,7 @@
           <a:p>
             <a:fld id="{A5BAA33C-0785-4A1B-865C-67CE1AB5BD5D}" type="datetimeFigureOut">
               <a:rPr lang="pt-BR" smtClean="0"/>
-              <a:t>17/07/2019</a:t>
+              <a:t>30/07/2019</a:t>
             </a:fld>
             <a:endParaRPr lang="pt-BR"/>
           </a:p>
@@ -2569,7 +2569,7 @@
           <a:p>
             <a:fld id="{A5BAA33C-0785-4A1B-865C-67CE1AB5BD5D}" type="datetimeFigureOut">
               <a:rPr lang="pt-BR" smtClean="0"/>
-              <a:t>17/07/2019</a:t>
+              <a:t>30/07/2019</a:t>
             </a:fld>
             <a:endParaRPr lang="pt-BR"/>
           </a:p>
@@ -21236,8 +21236,8 @@
         </p:nvSpPr>
         <p:spPr>
           <a:xfrm>
-            <a:off x="4962501" y="412683"/>
-            <a:ext cx="2121190" cy="1200329"/>
+            <a:off x="8427007" y="795915"/>
+            <a:ext cx="2121190" cy="369332"/>
           </a:xfrm>
           <a:prstGeom prst="rect">
             <a:avLst/>
@@ -21252,7 +21252,7 @@
           <a:p>
             <a:r>
               <a:rPr lang="pt-BR" dirty="0"/>
-              <a:t>Exemplo de arquitetura com um EPM Server e dois EPM Processor</a:t>
+              <a:t>Epmwebapi</a:t>
             </a:r>
           </a:p>
         </p:txBody>
@@ -21306,6 +21306,1044 @@
           </a:p>
         </p:txBody>
       </p:sp>
+      <p:cxnSp>
+        <p:nvCxnSpPr>
+          <p:cNvPr id="39" name="Straight Connector 70">
+            <a:extLst>
+              <a:ext uri="{FF2B5EF4-FFF2-40B4-BE49-F238E27FC236}">
+                <a16:creationId xmlns:a16="http://schemas.microsoft.com/office/drawing/2014/main" id="{BDFF3B0E-EFC9-4103-B6DC-177401F31A51}"/>
+              </a:ext>
+            </a:extLst>
+          </p:cNvPr>
+          <p:cNvCxnSpPr>
+            <a:cxnSpLocks/>
+            <a:endCxn id="58" idx="0"/>
+          </p:cNvCxnSpPr>
+          <p:nvPr/>
+        </p:nvCxnSpPr>
+        <p:spPr>
+          <a:xfrm flipH="1">
+            <a:off x="9290666" y="2696010"/>
+            <a:ext cx="2" cy="403977"/>
+          </a:xfrm>
+          <a:prstGeom prst="line">
+            <a:avLst/>
+          </a:prstGeom>
+          <a:ln w="28575" cap="flat" cmpd="sng" algn="ctr">
+            <a:solidFill>
+              <a:schemeClr val="accent6"/>
+            </a:solidFill>
+            <a:prstDash val="solid"/>
+            <a:round/>
+            <a:headEnd type="arrow" w="med" len="med"/>
+            <a:tailEnd type="arrow" w="med" len="med"/>
+          </a:ln>
+        </p:spPr>
+        <p:style>
+          <a:lnRef idx="0">
+            <a:scrgbClr r="0" g="0" b="0"/>
+          </a:lnRef>
+          <a:fillRef idx="0">
+            <a:scrgbClr r="0" g="0" b="0"/>
+          </a:fillRef>
+          <a:effectRef idx="0">
+            <a:scrgbClr r="0" g="0" b="0"/>
+          </a:effectRef>
+          <a:fontRef idx="minor">
+            <a:schemeClr val="tx1"/>
+          </a:fontRef>
+        </p:style>
+      </p:cxnSp>
+      <p:pic>
+        <p:nvPicPr>
+          <p:cNvPr id="46" name="Picture 71">
+            <a:extLst>
+              <a:ext uri="{FF2B5EF4-FFF2-40B4-BE49-F238E27FC236}">
+                <a16:creationId xmlns:a16="http://schemas.microsoft.com/office/drawing/2014/main" id="{B6C6DDB3-FF6B-4BB2-9BF6-098330BD6BAF}"/>
+              </a:ext>
+            </a:extLst>
+          </p:cNvPr>
+          <p:cNvPicPr>
+            <a:picLocks noChangeAspect="1"/>
+          </p:cNvPicPr>
+          <p:nvPr/>
+        </p:nvPicPr>
+        <p:blipFill>
+          <a:blip r:embed="rId2">
+            <a:extLst>
+              <a:ext uri="{28A0092B-C50C-407E-A947-70E740481C1C}">
+                <a14:useLocalDpi xmlns:a14="http://schemas.microsoft.com/office/drawing/2010/main" val="0"/>
+              </a:ext>
+            </a:extLst>
+          </a:blip>
+          <a:stretch>
+            <a:fillRect/>
+          </a:stretch>
+        </p:blipFill>
+        <p:spPr>
+          <a:xfrm>
+            <a:off x="8925864" y="2480836"/>
+            <a:ext cx="708750" cy="236250"/>
+          </a:xfrm>
+          <a:prstGeom prst="rect">
+            <a:avLst/>
+          </a:prstGeom>
+        </p:spPr>
+      </p:pic>
+      <p:sp>
+        <p:nvSpPr>
+          <p:cNvPr id="49" name="TextBox 72">
+            <a:extLst>
+              <a:ext uri="{FF2B5EF4-FFF2-40B4-BE49-F238E27FC236}">
+                <a16:creationId xmlns:a16="http://schemas.microsoft.com/office/drawing/2014/main" id="{90219A10-1193-4970-B6C4-077C81CF8506}"/>
+              </a:ext>
+            </a:extLst>
+          </p:cNvPr>
+          <p:cNvSpPr txBox="1"/>
+          <p:nvPr/>
+        </p:nvSpPr>
+        <p:spPr>
+          <a:xfrm>
+            <a:off x="9023005" y="2098702"/>
+            <a:ext cx="538929" cy="400110"/>
+          </a:xfrm>
+          <a:prstGeom prst="rect">
+            <a:avLst/>
+          </a:prstGeom>
+          <a:noFill/>
+        </p:spPr>
+        <p:txBody>
+          <a:bodyPr wrap="none" rtlCol="0">
+            <a:spAutoFit/>
+          </a:bodyPr>
+          <a:lstStyle/>
+          <a:p>
+            <a:pPr algn="ctr"/>
+            <a:r>
+              <a:rPr lang="pt-BR" sz="1000" dirty="0">
+                <a:latin typeface="Segoe UI" panose="020B0502040204020203" pitchFamily="34" charset="0"/>
+                <a:cs typeface="Segoe UI" panose="020B0502040204020203" pitchFamily="34" charset="0"/>
+              </a:rPr>
+              <a:t>EPM</a:t>
+            </a:r>
+          </a:p>
+          <a:p>
+            <a:pPr algn="ctr"/>
+            <a:r>
+              <a:rPr lang="pt-BR" sz="1000" dirty="0">
+                <a:latin typeface="Segoe UI" panose="020B0502040204020203" pitchFamily="34" charset="0"/>
+                <a:cs typeface="Segoe UI" panose="020B0502040204020203" pitchFamily="34" charset="0"/>
+              </a:rPr>
+              <a:t>Server</a:t>
+            </a:r>
+          </a:p>
+        </p:txBody>
+      </p:sp>
+      <p:sp>
+        <p:nvSpPr>
+          <p:cNvPr id="51" name="TextBox 76">
+            <a:extLst>
+              <a:ext uri="{FF2B5EF4-FFF2-40B4-BE49-F238E27FC236}">
+                <a16:creationId xmlns:a16="http://schemas.microsoft.com/office/drawing/2014/main" id="{B9350CE2-E001-44DC-B612-8CF4F46F82D2}"/>
+              </a:ext>
+            </a:extLst>
+          </p:cNvPr>
+          <p:cNvSpPr txBox="1"/>
+          <p:nvPr/>
+        </p:nvSpPr>
+        <p:spPr>
+          <a:xfrm>
+            <a:off x="8602070" y="3868195"/>
+            <a:ext cx="1401346" cy="246221"/>
+          </a:xfrm>
+          <a:prstGeom prst="rect">
+            <a:avLst/>
+          </a:prstGeom>
+          <a:noFill/>
+        </p:spPr>
+        <p:txBody>
+          <a:bodyPr wrap="none" rtlCol="0">
+            <a:spAutoFit/>
+          </a:bodyPr>
+          <a:lstStyle/>
+          <a:p>
+            <a:pPr algn="ctr"/>
+            <a:r>
+              <a:rPr lang="pt-BR" sz="1000" dirty="0">
+                <a:latin typeface="Segoe UI" panose="020B0502040204020203" pitchFamily="34" charset="0"/>
+                <a:cs typeface="Segoe UI" panose="020B0502040204020203" pitchFamily="34" charset="0"/>
+              </a:rPr>
+              <a:t>Python + epmwebapi</a:t>
+            </a:r>
+          </a:p>
+        </p:txBody>
+      </p:sp>
+      <p:cxnSp>
+        <p:nvCxnSpPr>
+          <p:cNvPr id="55" name="Straight Connector 84">
+            <a:extLst>
+              <a:ext uri="{FF2B5EF4-FFF2-40B4-BE49-F238E27FC236}">
+                <a16:creationId xmlns:a16="http://schemas.microsoft.com/office/drawing/2014/main" id="{BE381D7D-804F-45F6-84D1-C673AB44965C}"/>
+              </a:ext>
+            </a:extLst>
+          </p:cNvPr>
+          <p:cNvCxnSpPr/>
+          <p:nvPr/>
+        </p:nvCxnSpPr>
+        <p:spPr>
+          <a:xfrm>
+            <a:off x="9290666" y="3323411"/>
+            <a:ext cx="0" cy="327825"/>
+          </a:xfrm>
+          <a:prstGeom prst="line">
+            <a:avLst/>
+          </a:prstGeom>
+          <a:ln w="28575" cap="flat" cmpd="sng" algn="ctr">
+            <a:solidFill>
+              <a:schemeClr val="accent5"/>
+            </a:solidFill>
+            <a:prstDash val="solid"/>
+            <a:round/>
+            <a:headEnd type="arrow" w="med" len="med"/>
+            <a:tailEnd type="arrow" w="med" len="med"/>
+          </a:ln>
+        </p:spPr>
+        <p:style>
+          <a:lnRef idx="0">
+            <a:scrgbClr r="0" g="0" b="0"/>
+          </a:lnRef>
+          <a:fillRef idx="0">
+            <a:scrgbClr r="0" g="0" b="0"/>
+          </a:fillRef>
+          <a:effectRef idx="0">
+            <a:scrgbClr r="0" g="0" b="0"/>
+          </a:effectRef>
+          <a:fontRef idx="minor">
+            <a:schemeClr val="tx1"/>
+          </a:fontRef>
+        </p:style>
+      </p:cxnSp>
+      <p:pic>
+        <p:nvPicPr>
+          <p:cNvPr id="56" name="Picture 85">
+            <a:extLst>
+              <a:ext uri="{FF2B5EF4-FFF2-40B4-BE49-F238E27FC236}">
+                <a16:creationId xmlns:a16="http://schemas.microsoft.com/office/drawing/2014/main" id="{7A8FE446-A03E-402A-93B8-212EECB0D645}"/>
+              </a:ext>
+            </a:extLst>
+          </p:cNvPr>
+          <p:cNvPicPr>
+            <a:picLocks noChangeAspect="1"/>
+          </p:cNvPicPr>
+          <p:nvPr/>
+        </p:nvPicPr>
+        <p:blipFill>
+          <a:blip r:embed="rId3">
+            <a:extLst>
+              <a:ext uri="{28A0092B-C50C-407E-A947-70E740481C1C}">
+                <a14:useLocalDpi xmlns:a14="http://schemas.microsoft.com/office/drawing/2010/main" val="0"/>
+              </a:ext>
+            </a:extLst>
+          </a:blip>
+          <a:stretch>
+            <a:fillRect/>
+          </a:stretch>
+        </p:blipFill>
+        <p:spPr>
+          <a:xfrm>
+            <a:off x="8960434" y="3668165"/>
+            <a:ext cx="708750" cy="236250"/>
+          </a:xfrm>
+          <a:prstGeom prst="rect">
+            <a:avLst/>
+          </a:prstGeom>
+        </p:spPr>
+      </p:pic>
+      <p:pic>
+        <p:nvPicPr>
+          <p:cNvPr id="58" name="Picture 87">
+            <a:extLst>
+              <a:ext uri="{FF2B5EF4-FFF2-40B4-BE49-F238E27FC236}">
+                <a16:creationId xmlns:a16="http://schemas.microsoft.com/office/drawing/2014/main" id="{01D93E72-5C41-420C-8CB8-95918C5F5247}"/>
+              </a:ext>
+            </a:extLst>
+          </p:cNvPr>
+          <p:cNvPicPr>
+            <a:picLocks noChangeAspect="1"/>
+          </p:cNvPicPr>
+          <p:nvPr/>
+        </p:nvPicPr>
+        <p:blipFill>
+          <a:blip r:embed="rId3">
+            <a:extLst>
+              <a:ext uri="{28A0092B-C50C-407E-A947-70E740481C1C}">
+                <a14:useLocalDpi xmlns:a14="http://schemas.microsoft.com/office/drawing/2010/main" val="0"/>
+              </a:ext>
+            </a:extLst>
+          </a:blip>
+          <a:stretch>
+            <a:fillRect/>
+          </a:stretch>
+        </p:blipFill>
+        <p:spPr>
+          <a:xfrm>
+            <a:off x="8936291" y="3099987"/>
+            <a:ext cx="708750" cy="236250"/>
+          </a:xfrm>
+          <a:prstGeom prst="rect">
+            <a:avLst/>
+          </a:prstGeom>
+        </p:spPr>
+      </p:pic>
+      <p:sp>
+        <p:nvSpPr>
+          <p:cNvPr id="60" name="TextBox 79">
+            <a:extLst>
+              <a:ext uri="{FF2B5EF4-FFF2-40B4-BE49-F238E27FC236}">
+                <a16:creationId xmlns:a16="http://schemas.microsoft.com/office/drawing/2014/main" id="{1BC897D5-C99E-4A7D-8600-F6FE5D7757D2}"/>
+              </a:ext>
+            </a:extLst>
+          </p:cNvPr>
+          <p:cNvSpPr txBox="1"/>
+          <p:nvPr/>
+        </p:nvSpPr>
+        <p:spPr>
+          <a:xfrm>
+            <a:off x="8214023" y="2971309"/>
+            <a:ext cx="787395" cy="400110"/>
+          </a:xfrm>
+          <a:prstGeom prst="rect">
+            <a:avLst/>
+          </a:prstGeom>
+          <a:noFill/>
+        </p:spPr>
+        <p:txBody>
+          <a:bodyPr wrap="none" rtlCol="0">
+            <a:spAutoFit/>
+          </a:bodyPr>
+          <a:lstStyle/>
+          <a:p>
+            <a:pPr algn="ctr"/>
+            <a:r>
+              <a:rPr lang="pt-BR" sz="1000" dirty="0">
+                <a:latin typeface="Segoe UI" panose="020B0502040204020203" pitchFamily="34" charset="0"/>
+                <a:cs typeface="Segoe UI" panose="020B0502040204020203" pitchFamily="34" charset="0"/>
+              </a:rPr>
+              <a:t>EPM</a:t>
+            </a:r>
+          </a:p>
+          <a:p>
+            <a:pPr algn="ctr"/>
+            <a:r>
+              <a:rPr lang="pt-BR" sz="1000" dirty="0">
+                <a:latin typeface="Segoe UI" panose="020B0502040204020203" pitchFamily="34" charset="0"/>
+                <a:cs typeface="Segoe UI" panose="020B0502040204020203" pitchFamily="34" charset="0"/>
+              </a:rPr>
+              <a:t>Webserver</a:t>
+            </a:r>
+          </a:p>
+        </p:txBody>
+      </p:sp>
+      <p:sp>
+        <p:nvSpPr>
+          <p:cNvPr id="61" name="TextBox 91">
+            <a:extLst>
+              <a:ext uri="{FF2B5EF4-FFF2-40B4-BE49-F238E27FC236}">
+                <a16:creationId xmlns:a16="http://schemas.microsoft.com/office/drawing/2014/main" id="{C3CBBE5F-FFD4-43C9-B4AF-9CA849524B57}"/>
+              </a:ext>
+            </a:extLst>
+          </p:cNvPr>
+          <p:cNvSpPr txBox="1"/>
+          <p:nvPr/>
+        </p:nvSpPr>
+        <p:spPr>
+          <a:xfrm>
+            <a:off x="5114901" y="565083"/>
+            <a:ext cx="2121190" cy="1200329"/>
+          </a:xfrm>
+          <a:prstGeom prst="rect">
+            <a:avLst/>
+          </a:prstGeom>
+          <a:noFill/>
+        </p:spPr>
+        <p:txBody>
+          <a:bodyPr wrap="square" rtlCol="0">
+            <a:spAutoFit/>
+          </a:bodyPr>
+          <a:lstStyle/>
+          <a:p>
+            <a:r>
+              <a:rPr lang="pt-BR" dirty="0"/>
+              <a:t>Exemplo de arquitetura com um EPM Server e dois EPM Processor</a:t>
+            </a:r>
+          </a:p>
+        </p:txBody>
+      </p:sp>
+      <p:grpSp>
+        <p:nvGrpSpPr>
+          <p:cNvPr id="4" name="Agrupar 3">
+            <a:extLst>
+              <a:ext uri="{FF2B5EF4-FFF2-40B4-BE49-F238E27FC236}">
+                <a16:creationId xmlns:a16="http://schemas.microsoft.com/office/drawing/2014/main" id="{57851C3D-BBA6-4578-A4D1-75E6CB542330}"/>
+              </a:ext>
+            </a:extLst>
+          </p:cNvPr>
+          <p:cNvGrpSpPr/>
+          <p:nvPr/>
+        </p:nvGrpSpPr>
+        <p:grpSpPr>
+          <a:xfrm>
+            <a:off x="10167743" y="2719571"/>
+            <a:ext cx="779208" cy="651848"/>
+            <a:chOff x="10250048" y="2486414"/>
+            <a:chExt cx="779208" cy="651848"/>
+          </a:xfrm>
+        </p:grpSpPr>
+        <p:cxnSp>
+          <p:nvCxnSpPr>
+            <p:cNvPr id="50" name="Straight Connector 75">
+              <a:extLst>
+                <a:ext uri="{FF2B5EF4-FFF2-40B4-BE49-F238E27FC236}">
+                  <a16:creationId xmlns:a16="http://schemas.microsoft.com/office/drawing/2014/main" id="{4A58FB43-22EC-4B26-89CC-56E4B34D9FED}"/>
+                </a:ext>
+              </a:extLst>
+            </p:cNvPr>
+            <p:cNvCxnSpPr/>
+            <p:nvPr/>
+          </p:nvCxnSpPr>
+          <p:spPr>
+            <a:xfrm flipH="1">
+              <a:off x="10250048" y="2779774"/>
+              <a:ext cx="1290" cy="0"/>
+            </a:xfrm>
+            <a:prstGeom prst="line">
+              <a:avLst/>
+            </a:prstGeom>
+            <a:ln w="25400">
+              <a:solidFill>
+                <a:srgbClr val="0072B8"/>
+              </a:solidFill>
+            </a:ln>
+          </p:spPr>
+          <p:style>
+            <a:lnRef idx="1">
+              <a:schemeClr val="accent1"/>
+            </a:lnRef>
+            <a:fillRef idx="0">
+              <a:schemeClr val="accent1"/>
+            </a:fillRef>
+            <a:effectRef idx="0">
+              <a:schemeClr val="accent1"/>
+            </a:effectRef>
+            <a:fontRef idx="minor">
+              <a:schemeClr val="tx1"/>
+            </a:fontRef>
+          </p:style>
+        </p:cxnSp>
+        <p:cxnSp>
+          <p:nvCxnSpPr>
+            <p:cNvPr id="62" name="Straight Connector 70">
+              <a:extLst>
+                <a:ext uri="{FF2B5EF4-FFF2-40B4-BE49-F238E27FC236}">
+                  <a16:creationId xmlns:a16="http://schemas.microsoft.com/office/drawing/2014/main" id="{5543148C-B536-44E3-9A02-FF6D75AE328F}"/>
+                </a:ext>
+              </a:extLst>
+            </p:cNvPr>
+            <p:cNvCxnSpPr>
+              <a:cxnSpLocks/>
+            </p:cNvCxnSpPr>
+            <p:nvPr/>
+          </p:nvCxnSpPr>
+          <p:spPr>
+            <a:xfrm flipH="1">
+              <a:off x="10545384" y="2715131"/>
+              <a:ext cx="327826" cy="0"/>
+            </a:xfrm>
+            <a:prstGeom prst="line">
+              <a:avLst/>
+            </a:prstGeom>
+            <a:ln w="38100"/>
+          </p:spPr>
+          <p:style>
+            <a:lnRef idx="3">
+              <a:schemeClr val="accent6"/>
+            </a:lnRef>
+            <a:fillRef idx="0">
+              <a:schemeClr val="accent6"/>
+            </a:fillRef>
+            <a:effectRef idx="2">
+              <a:schemeClr val="accent6"/>
+            </a:effectRef>
+            <a:fontRef idx="minor">
+              <a:schemeClr val="tx1"/>
+            </a:fontRef>
+          </p:style>
+        </p:cxnSp>
+        <p:cxnSp>
+          <p:nvCxnSpPr>
+            <p:cNvPr id="63" name="Straight Connector 84">
+              <a:extLst>
+                <a:ext uri="{FF2B5EF4-FFF2-40B4-BE49-F238E27FC236}">
+                  <a16:creationId xmlns:a16="http://schemas.microsoft.com/office/drawing/2014/main" id="{A27E1E8F-3F0B-423D-A9AF-C73375CECF86}"/>
+                </a:ext>
+              </a:extLst>
+            </p:cNvPr>
+            <p:cNvCxnSpPr>
+              <a:cxnSpLocks/>
+            </p:cNvCxnSpPr>
+            <p:nvPr/>
+          </p:nvCxnSpPr>
+          <p:spPr>
+            <a:xfrm rot="5400000">
+              <a:off x="10709297" y="2952200"/>
+              <a:ext cx="0" cy="327825"/>
+            </a:xfrm>
+            <a:prstGeom prst="line">
+              <a:avLst/>
+            </a:prstGeom>
+            <a:ln w="38100"/>
+          </p:spPr>
+          <p:style>
+            <a:lnRef idx="3">
+              <a:schemeClr val="accent5"/>
+            </a:lnRef>
+            <a:fillRef idx="0">
+              <a:schemeClr val="accent5"/>
+            </a:fillRef>
+            <a:effectRef idx="2">
+              <a:schemeClr val="accent5"/>
+            </a:effectRef>
+            <a:fontRef idx="minor">
+              <a:schemeClr val="tx1"/>
+            </a:fontRef>
+          </p:style>
+        </p:cxnSp>
+        <p:sp>
+          <p:nvSpPr>
+            <p:cNvPr id="64" name="TextBox 72">
+              <a:extLst>
+                <a:ext uri="{FF2B5EF4-FFF2-40B4-BE49-F238E27FC236}">
+                  <a16:creationId xmlns:a16="http://schemas.microsoft.com/office/drawing/2014/main" id="{9CFB7FF0-C165-496A-8BB0-1531904DFE0A}"/>
+                </a:ext>
+              </a:extLst>
+            </p:cNvPr>
+            <p:cNvSpPr txBox="1"/>
+            <p:nvPr/>
+          </p:nvSpPr>
+          <p:spPr>
+            <a:xfrm>
+              <a:off x="10389337" y="2486414"/>
+              <a:ext cx="639919" cy="246221"/>
+            </a:xfrm>
+            <a:prstGeom prst="rect">
+              <a:avLst/>
+            </a:prstGeom>
+            <a:noFill/>
+          </p:spPr>
+          <p:txBody>
+            <a:bodyPr wrap="none" rtlCol="0">
+              <a:spAutoFit/>
+            </a:bodyPr>
+            <a:lstStyle/>
+            <a:p>
+              <a:pPr algn="ctr"/>
+              <a:r>
+                <a:rPr lang="pt-BR" sz="1000" dirty="0">
+                  <a:latin typeface="Segoe UI" panose="020B0502040204020203" pitchFamily="34" charset="0"/>
+                  <a:cs typeface="Segoe UI" panose="020B0502040204020203" pitchFamily="34" charset="0"/>
+                </a:rPr>
+                <a:t>OPC UA</a:t>
+              </a:r>
+            </a:p>
+          </p:txBody>
+        </p:sp>
+        <p:sp>
+          <p:nvSpPr>
+            <p:cNvPr id="65" name="TextBox 72">
+              <a:extLst>
+                <a:ext uri="{FF2B5EF4-FFF2-40B4-BE49-F238E27FC236}">
+                  <a16:creationId xmlns:a16="http://schemas.microsoft.com/office/drawing/2014/main" id="{23169366-B97D-4286-9C61-590BA8356AA0}"/>
+                </a:ext>
+              </a:extLst>
+            </p:cNvPr>
+            <p:cNvSpPr txBox="1"/>
+            <p:nvPr/>
+          </p:nvSpPr>
+          <p:spPr>
+            <a:xfrm>
+              <a:off x="10367309" y="2892041"/>
+              <a:ext cx="651139" cy="246221"/>
+            </a:xfrm>
+            <a:prstGeom prst="rect">
+              <a:avLst/>
+            </a:prstGeom>
+            <a:noFill/>
+          </p:spPr>
+          <p:txBody>
+            <a:bodyPr wrap="none" rtlCol="0">
+              <a:spAutoFit/>
+            </a:bodyPr>
+            <a:lstStyle/>
+            <a:p>
+              <a:pPr algn="ctr"/>
+              <a:r>
+                <a:rPr lang="pt-BR" sz="1000" dirty="0">
+                  <a:latin typeface="Segoe UI" panose="020B0502040204020203" pitchFamily="34" charset="0"/>
+                  <a:cs typeface="Segoe UI" panose="020B0502040204020203" pitchFamily="34" charset="0"/>
+                </a:rPr>
+                <a:t>API Rest</a:t>
+              </a:r>
+            </a:p>
+          </p:txBody>
+        </p:sp>
+      </p:grpSp>
+      <p:cxnSp>
+        <p:nvCxnSpPr>
+          <p:cNvPr id="57" name="Straight Connector 75">
+            <a:extLst>
+              <a:ext uri="{FF2B5EF4-FFF2-40B4-BE49-F238E27FC236}">
+                <a16:creationId xmlns:a16="http://schemas.microsoft.com/office/drawing/2014/main" id="{44B1DFFF-74DF-4226-8559-358D60C2E996}"/>
+              </a:ext>
+            </a:extLst>
+          </p:cNvPr>
+          <p:cNvCxnSpPr/>
+          <p:nvPr/>
+        </p:nvCxnSpPr>
+        <p:spPr>
+          <a:xfrm flipH="1">
+            <a:off x="8899419" y="4356906"/>
+            <a:ext cx="1290" cy="0"/>
+          </a:xfrm>
+          <a:prstGeom prst="line">
+            <a:avLst/>
+          </a:prstGeom>
+          <a:ln w="25400">
+            <a:solidFill>
+              <a:srgbClr val="0072B8"/>
+            </a:solidFill>
+          </a:ln>
+        </p:spPr>
+        <p:style>
+          <a:lnRef idx="1">
+            <a:schemeClr val="accent1"/>
+          </a:lnRef>
+          <a:fillRef idx="0">
+            <a:schemeClr val="accent1"/>
+          </a:fillRef>
+          <a:effectRef idx="0">
+            <a:schemeClr val="accent1"/>
+          </a:effectRef>
+          <a:fontRef idx="minor">
+            <a:schemeClr val="tx1"/>
+          </a:fontRef>
+        </p:style>
+      </p:cxnSp>
+      <p:sp>
+        <p:nvSpPr>
+          <p:cNvPr id="82" name="TextBox 91">
+            <a:extLst>
+              <a:ext uri="{FF2B5EF4-FFF2-40B4-BE49-F238E27FC236}">
+                <a16:creationId xmlns:a16="http://schemas.microsoft.com/office/drawing/2014/main" id="{BE197BDE-D2AA-4A38-B20C-CF2A3EE29B02}"/>
+              </a:ext>
+            </a:extLst>
+          </p:cNvPr>
+          <p:cNvSpPr txBox="1"/>
+          <p:nvPr/>
+        </p:nvSpPr>
+        <p:spPr>
+          <a:xfrm>
+            <a:off x="7104261" y="5542727"/>
+            <a:ext cx="2121190" cy="923330"/>
+          </a:xfrm>
+          <a:prstGeom prst="rect">
+            <a:avLst/>
+          </a:prstGeom>
+          <a:noFill/>
+        </p:spPr>
+        <p:txBody>
+          <a:bodyPr wrap="square" rtlCol="0">
+            <a:spAutoFit/>
+          </a:bodyPr>
+          <a:lstStyle/>
+          <a:p>
+            <a:r>
+              <a:rPr lang="pt-BR" dirty="0"/>
+              <a:t>Exemplo de arquitetura Simples</a:t>
+            </a:r>
+          </a:p>
+          <a:p>
+            <a:endParaRPr lang="pt-BR" dirty="0"/>
+          </a:p>
+        </p:txBody>
+      </p:sp>
+      <p:grpSp>
+        <p:nvGrpSpPr>
+          <p:cNvPr id="2" name="Agrupar 1">
+            <a:extLst>
+              <a:ext uri="{FF2B5EF4-FFF2-40B4-BE49-F238E27FC236}">
+                <a16:creationId xmlns:a16="http://schemas.microsoft.com/office/drawing/2014/main" id="{4DAB9344-EE58-4643-8654-AD185AB4C831}"/>
+              </a:ext>
+            </a:extLst>
+          </p:cNvPr>
+          <p:cNvGrpSpPr/>
+          <p:nvPr/>
+        </p:nvGrpSpPr>
+        <p:grpSpPr>
+          <a:xfrm>
+            <a:off x="5217680" y="4807020"/>
+            <a:ext cx="1570355" cy="2051452"/>
+            <a:chOff x="7219215" y="3664755"/>
+            <a:chExt cx="1570355" cy="2051452"/>
+          </a:xfrm>
+        </p:grpSpPr>
+        <p:cxnSp>
+          <p:nvCxnSpPr>
+            <p:cNvPr id="52" name="Straight Connector 70">
+              <a:extLst>
+                <a:ext uri="{FF2B5EF4-FFF2-40B4-BE49-F238E27FC236}">
+                  <a16:creationId xmlns:a16="http://schemas.microsoft.com/office/drawing/2014/main" id="{B935AAF1-DA49-4AAD-BD81-333DEED62BE0}"/>
+                </a:ext>
+              </a:extLst>
+            </p:cNvPr>
+            <p:cNvCxnSpPr/>
+            <p:nvPr/>
+          </p:nvCxnSpPr>
+          <p:spPr>
+            <a:xfrm>
+              <a:off x="7952109" y="4280751"/>
+              <a:ext cx="0" cy="327825"/>
+            </a:xfrm>
+            <a:prstGeom prst="line">
+              <a:avLst/>
+            </a:prstGeom>
+            <a:ln w="25400">
+              <a:solidFill>
+                <a:srgbClr val="0072B8"/>
+              </a:solidFill>
+            </a:ln>
+          </p:spPr>
+          <p:style>
+            <a:lnRef idx="1">
+              <a:schemeClr val="accent1"/>
+            </a:lnRef>
+            <a:fillRef idx="0">
+              <a:schemeClr val="accent1"/>
+            </a:fillRef>
+            <a:effectRef idx="0">
+              <a:schemeClr val="accent1"/>
+            </a:effectRef>
+            <a:fontRef idx="minor">
+              <a:schemeClr val="tx1"/>
+            </a:fontRef>
+          </p:style>
+        </p:cxnSp>
+        <p:pic>
+          <p:nvPicPr>
+            <p:cNvPr id="53" name="Picture 71">
+              <a:extLst>
+                <a:ext uri="{FF2B5EF4-FFF2-40B4-BE49-F238E27FC236}">
+                  <a16:creationId xmlns:a16="http://schemas.microsoft.com/office/drawing/2014/main" id="{0BDEFF5D-A7BA-44E6-ABF1-E9D8E7877FA5}"/>
+                </a:ext>
+              </a:extLst>
+            </p:cNvPr>
+            <p:cNvPicPr>
+              <a:picLocks noChangeAspect="1"/>
+            </p:cNvPicPr>
+            <p:nvPr/>
+          </p:nvPicPr>
+          <p:blipFill>
+            <a:blip r:embed="rId2">
+              <a:extLst>
+                <a:ext uri="{28A0092B-C50C-407E-A947-70E740481C1C}">
+                  <a14:useLocalDpi xmlns:a14="http://schemas.microsoft.com/office/drawing/2010/main" val="0"/>
+                </a:ext>
+              </a:extLst>
+            </a:blip>
+            <a:stretch>
+              <a:fillRect/>
+            </a:stretch>
+          </p:blipFill>
+          <p:spPr>
+            <a:xfrm>
+              <a:off x="7575235" y="4057968"/>
+              <a:ext cx="708750" cy="236250"/>
+            </a:xfrm>
+            <a:prstGeom prst="rect">
+              <a:avLst/>
+            </a:prstGeom>
+          </p:spPr>
+        </p:pic>
+        <p:sp>
+          <p:nvSpPr>
+            <p:cNvPr id="54" name="TextBox 72">
+              <a:extLst>
+                <a:ext uri="{FF2B5EF4-FFF2-40B4-BE49-F238E27FC236}">
+                  <a16:creationId xmlns:a16="http://schemas.microsoft.com/office/drawing/2014/main" id="{8B793889-D882-4AD9-A95D-79F2FEF95B44}"/>
+                </a:ext>
+              </a:extLst>
+            </p:cNvPr>
+            <p:cNvSpPr txBox="1"/>
+            <p:nvPr/>
+          </p:nvSpPr>
+          <p:spPr>
+            <a:xfrm>
+              <a:off x="7410538" y="3664755"/>
+              <a:ext cx="1007007" cy="400110"/>
+            </a:xfrm>
+            <a:prstGeom prst="rect">
+              <a:avLst/>
+            </a:prstGeom>
+            <a:noFill/>
+          </p:spPr>
+          <p:txBody>
+            <a:bodyPr wrap="none" rtlCol="0">
+              <a:spAutoFit/>
+            </a:bodyPr>
+            <a:lstStyle/>
+            <a:p>
+              <a:pPr algn="ctr"/>
+              <a:r>
+                <a:rPr lang="pt-BR" sz="1000" dirty="0">
+                  <a:latin typeface="Segoe UI" panose="020B0502040204020203" pitchFamily="34" charset="0"/>
+                  <a:cs typeface="Segoe UI" panose="020B0502040204020203" pitchFamily="34" charset="0"/>
+                </a:rPr>
+                <a:t>EPM</a:t>
+              </a:r>
+            </a:p>
+            <a:p>
+              <a:pPr algn="ctr"/>
+              <a:r>
+                <a:rPr lang="pt-BR" sz="1000" dirty="0">
+                  <a:latin typeface="Segoe UI" panose="020B0502040204020203" pitchFamily="34" charset="0"/>
+                  <a:cs typeface="Segoe UI" panose="020B0502040204020203" pitchFamily="34" charset="0"/>
+                </a:rPr>
+                <a:t>Server(Master)</a:t>
+              </a:r>
+            </a:p>
+          </p:txBody>
+        </p:sp>
+        <p:sp>
+          <p:nvSpPr>
+            <p:cNvPr id="59" name="TextBox 76">
+              <a:extLst>
+                <a:ext uri="{FF2B5EF4-FFF2-40B4-BE49-F238E27FC236}">
+                  <a16:creationId xmlns:a16="http://schemas.microsoft.com/office/drawing/2014/main" id="{5325C88F-CAFD-4F45-8283-DD1664DE5D7D}"/>
+                </a:ext>
+              </a:extLst>
+            </p:cNvPr>
+            <p:cNvSpPr txBox="1"/>
+            <p:nvPr/>
+          </p:nvSpPr>
+          <p:spPr>
+            <a:xfrm>
+              <a:off x="7219215" y="5162209"/>
+              <a:ext cx="732893" cy="553998"/>
+            </a:xfrm>
+            <a:prstGeom prst="rect">
+              <a:avLst/>
+            </a:prstGeom>
+            <a:noFill/>
+          </p:spPr>
+          <p:txBody>
+            <a:bodyPr wrap="none" rtlCol="0">
+              <a:spAutoFit/>
+            </a:bodyPr>
+            <a:lstStyle/>
+            <a:p>
+              <a:pPr algn="ctr"/>
+              <a:r>
+                <a:rPr lang="pt-BR" sz="1000" dirty="0">
+                  <a:latin typeface="Segoe UI" panose="020B0502040204020203" pitchFamily="34" charset="0"/>
+                  <a:cs typeface="Segoe UI" panose="020B0502040204020203" pitchFamily="34" charset="0"/>
+                </a:rPr>
+                <a:t>EPM</a:t>
+              </a:r>
+            </a:p>
+            <a:p>
+              <a:pPr algn="ctr"/>
+              <a:r>
+                <a:rPr lang="pt-BR" sz="1000" dirty="0">
+                  <a:latin typeface="Segoe UI" panose="020B0502040204020203" pitchFamily="34" charset="0"/>
+                  <a:cs typeface="Segoe UI" panose="020B0502040204020203" pitchFamily="34" charset="0"/>
+                </a:rPr>
+                <a:t>Processor</a:t>
+              </a:r>
+            </a:p>
+            <a:p>
+              <a:pPr algn="ctr"/>
+              <a:endParaRPr lang="pt-BR" sz="1000" dirty="0">
+                <a:latin typeface="Segoe UI" panose="020B0502040204020203" pitchFamily="34" charset="0"/>
+                <a:cs typeface="Segoe UI" panose="020B0502040204020203" pitchFamily="34" charset="0"/>
+              </a:endParaRPr>
+            </a:p>
+          </p:txBody>
+        </p:sp>
+        <p:sp>
+          <p:nvSpPr>
+            <p:cNvPr id="66" name="TextBox 79">
+              <a:extLst>
+                <a:ext uri="{FF2B5EF4-FFF2-40B4-BE49-F238E27FC236}">
+                  <a16:creationId xmlns:a16="http://schemas.microsoft.com/office/drawing/2014/main" id="{27ACE8E1-9228-4089-BFD1-1C4AFA3AF6EA}"/>
+                </a:ext>
+              </a:extLst>
+            </p:cNvPr>
+            <p:cNvSpPr txBox="1"/>
+            <p:nvPr/>
+          </p:nvSpPr>
+          <p:spPr>
+            <a:xfrm>
+              <a:off x="8002175" y="5153806"/>
+              <a:ext cx="787395" cy="400110"/>
+            </a:xfrm>
+            <a:prstGeom prst="rect">
+              <a:avLst/>
+            </a:prstGeom>
+            <a:noFill/>
+          </p:spPr>
+          <p:txBody>
+            <a:bodyPr wrap="none" rtlCol="0">
+              <a:spAutoFit/>
+            </a:bodyPr>
+            <a:lstStyle/>
+            <a:p>
+              <a:pPr algn="ctr"/>
+              <a:r>
+                <a:rPr lang="pt-BR" sz="1000" dirty="0">
+                  <a:latin typeface="Segoe UI" panose="020B0502040204020203" pitchFamily="34" charset="0"/>
+                  <a:cs typeface="Segoe UI" panose="020B0502040204020203" pitchFamily="34" charset="0"/>
+                </a:rPr>
+                <a:t>EPM</a:t>
+              </a:r>
+            </a:p>
+            <a:p>
+              <a:pPr algn="ctr"/>
+              <a:r>
+                <a:rPr lang="pt-BR" sz="1000" dirty="0">
+                  <a:latin typeface="Segoe UI" panose="020B0502040204020203" pitchFamily="34" charset="0"/>
+                  <a:cs typeface="Segoe UI" panose="020B0502040204020203" pitchFamily="34" charset="0"/>
+                </a:rPr>
+                <a:t>Webserver</a:t>
+              </a:r>
+            </a:p>
+          </p:txBody>
+        </p:sp>
+        <p:cxnSp>
+          <p:nvCxnSpPr>
+            <p:cNvPr id="70" name="Straight Connector 84">
+              <a:extLst>
+                <a:ext uri="{FF2B5EF4-FFF2-40B4-BE49-F238E27FC236}">
+                  <a16:creationId xmlns:a16="http://schemas.microsoft.com/office/drawing/2014/main" id="{B4B0811E-5F17-40C0-9C9B-1785572B48C1}"/>
+                </a:ext>
+              </a:extLst>
+            </p:cNvPr>
+            <p:cNvCxnSpPr/>
+            <p:nvPr/>
+          </p:nvCxnSpPr>
+          <p:spPr>
+            <a:xfrm>
+              <a:off x="7952108" y="4596955"/>
+              <a:ext cx="0" cy="327825"/>
+            </a:xfrm>
+            <a:prstGeom prst="line">
+              <a:avLst/>
+            </a:prstGeom>
+            <a:ln w="25400">
+              <a:solidFill>
+                <a:srgbClr val="0072B8"/>
+              </a:solidFill>
+            </a:ln>
+          </p:spPr>
+          <p:style>
+            <a:lnRef idx="1">
+              <a:schemeClr val="accent1"/>
+            </a:lnRef>
+            <a:fillRef idx="0">
+              <a:schemeClr val="accent1"/>
+            </a:fillRef>
+            <a:effectRef idx="0">
+              <a:schemeClr val="accent1"/>
+            </a:effectRef>
+            <a:fontRef idx="minor">
+              <a:schemeClr val="tx1"/>
+            </a:fontRef>
+          </p:style>
+        </p:cxnSp>
+        <p:pic>
+          <p:nvPicPr>
+            <p:cNvPr id="74" name="Picture 85">
+              <a:extLst>
+                <a:ext uri="{FF2B5EF4-FFF2-40B4-BE49-F238E27FC236}">
+                  <a16:creationId xmlns:a16="http://schemas.microsoft.com/office/drawing/2014/main" id="{7BE9AAB3-AC5E-46B8-A5F2-4EE76A52D1CC}"/>
+                </a:ext>
+              </a:extLst>
+            </p:cNvPr>
+            <p:cNvPicPr>
+              <a:picLocks noChangeAspect="1"/>
+            </p:cNvPicPr>
+            <p:nvPr/>
+          </p:nvPicPr>
+          <p:blipFill>
+            <a:blip r:embed="rId3">
+              <a:extLst>
+                <a:ext uri="{28A0092B-C50C-407E-A947-70E740481C1C}">
+                  <a14:useLocalDpi xmlns:a14="http://schemas.microsoft.com/office/drawing/2010/main" val="0"/>
+                </a:ext>
+              </a:extLst>
+            </a:blip>
+            <a:stretch>
+              <a:fillRect/>
+            </a:stretch>
+          </p:blipFill>
+          <p:spPr>
+            <a:xfrm>
+              <a:off x="7614560" y="4941231"/>
+              <a:ext cx="708750" cy="236250"/>
+            </a:xfrm>
+            <a:prstGeom prst="rect">
+              <a:avLst/>
+            </a:prstGeom>
+          </p:spPr>
+        </p:pic>
+        <p:sp>
+          <p:nvSpPr>
+            <p:cNvPr id="89" name="TextBox 76">
+              <a:extLst>
+                <a:ext uri="{FF2B5EF4-FFF2-40B4-BE49-F238E27FC236}">
+                  <a16:creationId xmlns:a16="http://schemas.microsoft.com/office/drawing/2014/main" id="{BED0CF0C-BFAB-4605-82FF-E80ED0B09130}"/>
+                </a:ext>
+              </a:extLst>
+            </p:cNvPr>
+            <p:cNvSpPr txBox="1"/>
+            <p:nvPr/>
+          </p:nvSpPr>
+          <p:spPr>
+            <a:xfrm>
+              <a:off x="7818204" y="5192987"/>
+              <a:ext cx="284053" cy="261610"/>
+            </a:xfrm>
+            <a:prstGeom prst="rect">
+              <a:avLst/>
+            </a:prstGeom>
+            <a:noFill/>
+          </p:spPr>
+          <p:txBody>
+            <a:bodyPr wrap="none" rtlCol="0">
+              <a:spAutoFit/>
+            </a:bodyPr>
+            <a:lstStyle/>
+            <a:p>
+              <a:pPr algn="ctr"/>
+              <a:r>
+                <a:rPr lang="pt-BR" sz="1100" b="1" dirty="0">
+                  <a:latin typeface="Segoe UI" panose="020B0502040204020203" pitchFamily="34" charset="0"/>
+                  <a:cs typeface="Segoe UI" panose="020B0502040204020203" pitchFamily="34" charset="0"/>
+                </a:rPr>
+                <a:t>+</a:t>
+              </a:r>
+            </a:p>
+          </p:txBody>
+        </p:sp>
+      </p:grpSp>
     </p:spTree>
     <p:extLst>
       <p:ext uri="{BB962C8B-B14F-4D97-AF65-F5344CB8AC3E}">
@@ -21581,15 +22619,90 @@
 </file>
 
 <file path=customXml/item1.xml><?xml version="1.0" encoding="utf-8"?>
-<?mso-contentType ?>
-<FormTemplates xmlns="http://schemas.microsoft.com/sharepoint/v3/contenttype/forms">
-  <Display>DocumentLibraryForm</Display>
-  <Edit>DocumentLibraryForm</Edit>
-  <New>DocumentLibraryForm</New>
-</FormTemplates>
+<p:properties xmlns:p="http://schemas.microsoft.com/office/2006/metadata/properties" xmlns:xsi="http://www.w3.org/2001/XMLSchema-instance" xmlns:pc="http://schemas.microsoft.com/office/infopath/2007/PartnerControls">
+  <documentManagement>
+    <TaskGroup xmlns="http://schemas.microsoft.com/sharepoint/v3">
+      <UserInfo>
+        <DisplayName/>
+        <AccountId xsi:nil="true"/>
+        <AccountType/>
+      </UserInfo>
+    </TaskGroup>
+    <Frame_x0020_Count xmlns="e9bb39ac-ea54-4350-abd5-7ff991ff1845" xsi:nil="true"/>
+    <F-Number xmlns="e9bb39ac-ea54-4350-abd5-7ff991ff1845" xsi:nil="true"/>
+    <Stream_x0020_name xmlns="e9bb39ac-ea54-4350-abd5-7ff991ff1845" xsi:nil="true"/>
+    <Sample_x0020_Rate xmlns="e9bb39ac-ea54-4350-abd5-7ff991ff1845" xsi:nil="true"/>
+    <Year xmlns="e9bb39ac-ea54-4350-abd5-7ff991ff1845" xsi:nil="true"/>
+    <Artist xmlns="e9bb39ac-ea54-4350-abd5-7ff991ff1845" xsi:nil="true"/>
+    <Width xmlns="e9bb39ac-ea54-4350-abd5-7ff991ff1845" xsi:nil="true"/>
+    <_dlc_DocId xmlns="e9bb39ac-ea54-4350-abd5-7ff991ff1845">M4TWK6UF55AS-8-213</_dlc_DocId>
+    <Camera_x0020_Model xmlns="e9bb39ac-ea54-4350-abd5-7ff991ff1845" xsi:nil="true"/>
+    <_dlc_DocIdUrl xmlns="e9bb39ac-ea54-4350-abd5-7ff991ff1845">
+      <Url>http://portal.elipse.com.br/_layouts/DocIdRedir.aspx?ID=M4TWK6UF55AS-8-213</Url>
+      <Description>M4TWK6UF55AS-8-213</Description>
+    </_dlc_DocIdUrl>
+    <Bit_x0020_Depth xmlns="e9bb39ac-ea54-4350-abd5-7ff991ff1845" xsi:nil="true"/>
+    <Company xmlns="http://schemas.microsoft.com/sharepoint/v3" xsi:nil="true"/>
+    <Color_x0020_Representation xmlns="e9bb39ac-ea54-4350-abd5-7ff991ff1845" xsi:nil="true"/>
+    <Track_x0020_Number xmlns="e9bb39ac-ea54-4350-abd5-7ff991ff1845" xsi:nil="true"/>
+    <Bit_x0020_Rate xmlns="e9bb39ac-ea54-4350-abd5-7ff991ff1845" xsi:nil="true"/>
+    <Focal_x0020_Length xmlns="e9bb39ac-ea54-4350-abd5-7ff991ff1845" xsi:nil="true"/>
+    <Album_x0020_Title xmlns="e9bb39ac-ea54-4350-abd5-7ff991ff1845" xsi:nil="true"/>
+    <Resolution xmlns="e9bb39ac-ea54-4350-abd5-7ff991ff1845" xsi:nil="true"/>
+    <Exposure_x0020_Time xmlns="e9bb39ac-ea54-4350-abd5-7ff991ff1845" xsi:nil="true"/>
+    <Channels xmlns="e9bb39ac-ea54-4350-abd5-7ff991ff1845" xsi:nil="true"/>
+    <Height xmlns="e9bb39ac-ea54-4350-abd5-7ff991ff1845" xsi:nil="true"/>
+  </documentManagement>
+</p:properties>
 </file>
 
 <file path=customXml/item2.xml><?xml version="1.0" encoding="utf-8"?>
+<?mso-contentType ?>
+<spe:Receivers xmlns:spe="http://schemas.microsoft.com/sharepoint/events">
+  <Receiver>
+    <Name>Document ID Generator</Name>
+    <Synchronization>Synchronous</Synchronization>
+    <Type>10001</Type>
+    <SequenceNumber>1000</SequenceNumber>
+    <Assembly>Microsoft.Office.DocumentManagement, Version=14.0.0.0, Culture=neutral, PublicKeyToken=71e9bce111e9429c</Assembly>
+    <Class>Microsoft.Office.DocumentManagement.Internal.DocIdHandler</Class>
+    <Data/>
+    <Filter/>
+  </Receiver>
+  <Receiver>
+    <Name>Document ID Generator</Name>
+    <Synchronization>Synchronous</Synchronization>
+    <Type>10002</Type>
+    <SequenceNumber>1001</SequenceNumber>
+    <Assembly>Microsoft.Office.DocumentManagement, Version=14.0.0.0, Culture=neutral, PublicKeyToken=71e9bce111e9429c</Assembly>
+    <Class>Microsoft.Office.DocumentManagement.Internal.DocIdHandler</Class>
+    <Data/>
+    <Filter/>
+  </Receiver>
+  <Receiver>
+    <Name>Document ID Generator</Name>
+    <Synchronization>Synchronous</Synchronization>
+    <Type>10004</Type>
+    <SequenceNumber>1002</SequenceNumber>
+    <Assembly>Microsoft.Office.DocumentManagement, Version=14.0.0.0, Culture=neutral, PublicKeyToken=71e9bce111e9429c</Assembly>
+    <Class>Microsoft.Office.DocumentManagement.Internal.DocIdHandler</Class>
+    <Data/>
+    <Filter/>
+  </Receiver>
+  <Receiver>
+    <Name>Document ID Generator</Name>
+    <Synchronization>Synchronous</Synchronization>
+    <Type>10006</Type>
+    <SequenceNumber>1003</SequenceNumber>
+    <Assembly>Microsoft.Office.DocumentManagement, Version=14.0.0.0, Culture=neutral, PublicKeyToken=71e9bce111e9429c</Assembly>
+    <Class>Microsoft.Office.DocumentManagement.Internal.DocIdHandler</Class>
+    <Data/>
+    <Filter/>
+  </Receiver>
+</spe:Receivers>
+</file>
+
+<file path=customXml/item3.xml><?xml version="1.0" encoding="utf-8"?>
 <ct:contentTypeSchema xmlns:ct="http://schemas.microsoft.com/office/2006/metadata/contentType" xmlns:ma="http://schemas.microsoft.com/office/2006/metadata/properties/metaAttributes" ct:_="" ma:_="" ma:contentTypeName="Document" ma:contentTypeID="0x0101007D549BFAFE8E5F43880CAFE2D5CAA55D" ma:contentTypeVersion="24" ma:contentTypeDescription="Create a new document." ma:contentTypeScope="" ma:versionID="cabd65ca1e2131974802f0dec5e19bb9">
   <xsd:schema xmlns:xsd="http://www.w3.org/2001/XMLSchema" xmlns:xs="http://www.w3.org/2001/XMLSchema" xmlns:p="http://schemas.microsoft.com/office/2006/metadata/properties" xmlns:ns1="http://schemas.microsoft.com/sharepoint/v3" xmlns:ns3="e9bb39ac-ea54-4350-abd5-7ff991ff1845" targetNamespace="http://schemas.microsoft.com/office/2006/metadata/properties" ma:root="true" ma:fieldsID="3ecabbdfa91c3905e83a2b97aa6757db" ns1:_="" ns3:_="">
     <xsd:import namespace="http://schemas.microsoft.com/sharepoint/v3"/>
@@ -21910,99 +23023,41 @@
 </ct:contentTypeSchema>
 </file>
 
-<file path=customXml/item3.xml><?xml version="1.0" encoding="utf-8"?>
+<file path=customXml/item4.xml><?xml version="1.0" encoding="utf-8"?>
 <?mso-contentType ?>
-<spe:Receivers xmlns:spe="http://schemas.microsoft.com/sharepoint/events">
-  <Receiver>
-    <Name>Document ID Generator</Name>
-    <Synchronization>Synchronous</Synchronization>
-    <Type>10001</Type>
-    <SequenceNumber>1000</SequenceNumber>
-    <Assembly>Microsoft.Office.DocumentManagement, Version=14.0.0.0, Culture=neutral, PublicKeyToken=71e9bce111e9429c</Assembly>
-    <Class>Microsoft.Office.DocumentManagement.Internal.DocIdHandler</Class>
-    <Data/>
-    <Filter/>
-  </Receiver>
-  <Receiver>
-    <Name>Document ID Generator</Name>
-    <Synchronization>Synchronous</Synchronization>
-    <Type>10002</Type>
-    <SequenceNumber>1001</SequenceNumber>
-    <Assembly>Microsoft.Office.DocumentManagement, Version=14.0.0.0, Culture=neutral, PublicKeyToken=71e9bce111e9429c</Assembly>
-    <Class>Microsoft.Office.DocumentManagement.Internal.DocIdHandler</Class>
-    <Data/>
-    <Filter/>
-  </Receiver>
-  <Receiver>
-    <Name>Document ID Generator</Name>
-    <Synchronization>Synchronous</Synchronization>
-    <Type>10004</Type>
-    <SequenceNumber>1002</SequenceNumber>
-    <Assembly>Microsoft.Office.DocumentManagement, Version=14.0.0.0, Culture=neutral, PublicKeyToken=71e9bce111e9429c</Assembly>
-    <Class>Microsoft.Office.DocumentManagement.Internal.DocIdHandler</Class>
-    <Data/>
-    <Filter/>
-  </Receiver>
-  <Receiver>
-    <Name>Document ID Generator</Name>
-    <Synchronization>Synchronous</Synchronization>
-    <Type>10006</Type>
-    <SequenceNumber>1003</SequenceNumber>
-    <Assembly>Microsoft.Office.DocumentManagement, Version=14.0.0.0, Culture=neutral, PublicKeyToken=71e9bce111e9429c</Assembly>
-    <Class>Microsoft.Office.DocumentManagement.Internal.DocIdHandler</Class>
-    <Data/>
-    <Filter/>
-  </Receiver>
-</spe:Receivers>
-</file>
-
-<file path=customXml/item4.xml><?xml version="1.0" encoding="utf-8"?>
-<p:properties xmlns:p="http://schemas.microsoft.com/office/2006/metadata/properties" xmlns:xsi="http://www.w3.org/2001/XMLSchema-instance" xmlns:pc="http://schemas.microsoft.com/office/infopath/2007/PartnerControls">
-  <documentManagement>
-    <TaskGroup xmlns="http://schemas.microsoft.com/sharepoint/v3">
-      <UserInfo>
-        <DisplayName/>
-        <AccountId xsi:nil="true"/>
-        <AccountType/>
-      </UserInfo>
-    </TaskGroup>
-    <Frame_x0020_Count xmlns="e9bb39ac-ea54-4350-abd5-7ff991ff1845" xsi:nil="true"/>
-    <F-Number xmlns="e9bb39ac-ea54-4350-abd5-7ff991ff1845" xsi:nil="true"/>
-    <Stream_x0020_name xmlns="e9bb39ac-ea54-4350-abd5-7ff991ff1845" xsi:nil="true"/>
-    <Sample_x0020_Rate xmlns="e9bb39ac-ea54-4350-abd5-7ff991ff1845" xsi:nil="true"/>
-    <Year xmlns="e9bb39ac-ea54-4350-abd5-7ff991ff1845" xsi:nil="true"/>
-    <Artist xmlns="e9bb39ac-ea54-4350-abd5-7ff991ff1845" xsi:nil="true"/>
-    <Width xmlns="e9bb39ac-ea54-4350-abd5-7ff991ff1845" xsi:nil="true"/>
-    <_dlc_DocId xmlns="e9bb39ac-ea54-4350-abd5-7ff991ff1845">M4TWK6UF55AS-8-213</_dlc_DocId>
-    <Camera_x0020_Model xmlns="e9bb39ac-ea54-4350-abd5-7ff991ff1845" xsi:nil="true"/>
-    <_dlc_DocIdUrl xmlns="e9bb39ac-ea54-4350-abd5-7ff991ff1845">
-      <Url>http://portal.elipse.com.br/_layouts/DocIdRedir.aspx?ID=M4TWK6UF55AS-8-213</Url>
-      <Description>M4TWK6UF55AS-8-213</Description>
-    </_dlc_DocIdUrl>
-    <Bit_x0020_Depth xmlns="e9bb39ac-ea54-4350-abd5-7ff991ff1845" xsi:nil="true"/>
-    <Company xmlns="http://schemas.microsoft.com/sharepoint/v3" xsi:nil="true"/>
-    <Color_x0020_Representation xmlns="e9bb39ac-ea54-4350-abd5-7ff991ff1845" xsi:nil="true"/>
-    <Track_x0020_Number xmlns="e9bb39ac-ea54-4350-abd5-7ff991ff1845" xsi:nil="true"/>
-    <Bit_x0020_Rate xmlns="e9bb39ac-ea54-4350-abd5-7ff991ff1845" xsi:nil="true"/>
-    <Focal_x0020_Length xmlns="e9bb39ac-ea54-4350-abd5-7ff991ff1845" xsi:nil="true"/>
-    <Album_x0020_Title xmlns="e9bb39ac-ea54-4350-abd5-7ff991ff1845" xsi:nil="true"/>
-    <Resolution xmlns="e9bb39ac-ea54-4350-abd5-7ff991ff1845" xsi:nil="true"/>
-    <Exposure_x0020_Time xmlns="e9bb39ac-ea54-4350-abd5-7ff991ff1845" xsi:nil="true"/>
-    <Channels xmlns="e9bb39ac-ea54-4350-abd5-7ff991ff1845" xsi:nil="true"/>
-    <Height xmlns="e9bb39ac-ea54-4350-abd5-7ff991ff1845" xsi:nil="true"/>
-  </documentManagement>
-</p:properties>
+<FormTemplates xmlns="http://schemas.microsoft.com/sharepoint/v3/contenttype/forms">
+  <Display>DocumentLibraryForm</Display>
+  <Edit>DocumentLibraryForm</Edit>
+  <New>DocumentLibraryForm</New>
+</FormTemplates>
 </file>
 
 <file path=customXml/itemProps1.xml><?xml version="1.0" encoding="utf-8"?>
-<ds:datastoreItem xmlns:ds="http://schemas.openxmlformats.org/officeDocument/2006/customXml" ds:itemID="{41EE2097-F55F-4F9F-AF8F-F2949B171E16}">
+<ds:datastoreItem xmlns:ds="http://schemas.openxmlformats.org/officeDocument/2006/customXml" ds:itemID="{8932599B-802B-4437-A488-9CBA2113F6A6}">
   <ds:schemaRefs>
-    <ds:schemaRef ds:uri="http://schemas.microsoft.com/sharepoint/v3/contenttype/forms"/>
+    <ds:schemaRef ds:uri="http://schemas.microsoft.com/office/2006/documentManagement/types"/>
+    <ds:schemaRef ds:uri="http://schemas.microsoft.com/office/infopath/2007/PartnerControls"/>
+    <ds:schemaRef ds:uri="http://www.w3.org/XML/1998/namespace"/>
+    <ds:schemaRef ds:uri="http://purl.org/dc/dcmitype/"/>
+    <ds:schemaRef ds:uri="http://purl.org/dc/terms/"/>
+    <ds:schemaRef ds:uri="http://schemas.openxmlformats.org/package/2006/metadata/core-properties"/>
+    <ds:schemaRef ds:uri="http://purl.org/dc/elements/1.1/"/>
+    <ds:schemaRef ds:uri="e9bb39ac-ea54-4350-abd5-7ff991ff1845"/>
+    <ds:schemaRef ds:uri="http://schemas.microsoft.com/sharepoint/v3"/>
+    <ds:schemaRef ds:uri="http://schemas.microsoft.com/office/2006/metadata/properties"/>
   </ds:schemaRefs>
 </ds:datastoreItem>
 </file>
 
 <file path=customXml/itemProps2.xml><?xml version="1.0" encoding="utf-8"?>
+<ds:datastoreItem xmlns:ds="http://schemas.openxmlformats.org/officeDocument/2006/customXml" ds:itemID="{42C0714E-021E-409A-8446-9B043BB90BFA}">
+  <ds:schemaRefs>
+    <ds:schemaRef ds:uri="http://schemas.microsoft.com/sharepoint/events"/>
+  </ds:schemaRefs>
+</ds:datastoreItem>
+</file>
+
+<file path=customXml/itemProps3.xml><?xml version="1.0" encoding="utf-8"?>
 <ds:datastoreItem xmlns:ds="http://schemas.openxmlformats.org/officeDocument/2006/customXml" ds:itemID="{D8E893AA-B4E1-4939-8F13-2DEC81ADF64A}">
   <ds:schemaRefs>
     <ds:schemaRef ds:uri="http://schemas.microsoft.com/office/2006/metadata/contentType"/>
@@ -22021,27 +23076,10 @@
 </ds:datastoreItem>
 </file>
 
-<file path=customXml/itemProps3.xml><?xml version="1.0" encoding="utf-8"?>
-<ds:datastoreItem xmlns:ds="http://schemas.openxmlformats.org/officeDocument/2006/customXml" ds:itemID="{42C0714E-021E-409A-8446-9B043BB90BFA}">
+<file path=customXml/itemProps4.xml><?xml version="1.0" encoding="utf-8"?>
+<ds:datastoreItem xmlns:ds="http://schemas.openxmlformats.org/officeDocument/2006/customXml" ds:itemID="{41EE2097-F55F-4F9F-AF8F-F2949B171E16}">
   <ds:schemaRefs>
-    <ds:schemaRef ds:uri="http://schemas.microsoft.com/sharepoint/events"/>
-  </ds:schemaRefs>
-</ds:datastoreItem>
-</file>
-
-<file path=customXml/itemProps4.xml><?xml version="1.0" encoding="utf-8"?>
-<ds:datastoreItem xmlns:ds="http://schemas.openxmlformats.org/officeDocument/2006/customXml" ds:itemID="{8932599B-802B-4437-A488-9CBA2113F6A6}">
-  <ds:schemaRefs>
-    <ds:schemaRef ds:uri="http://schemas.microsoft.com/office/2006/documentManagement/types"/>
-    <ds:schemaRef ds:uri="http://schemas.microsoft.com/office/infopath/2007/PartnerControls"/>
-    <ds:schemaRef ds:uri="http://www.w3.org/XML/1998/namespace"/>
-    <ds:schemaRef ds:uri="http://purl.org/dc/dcmitype/"/>
-    <ds:schemaRef ds:uri="http://purl.org/dc/terms/"/>
-    <ds:schemaRef ds:uri="http://schemas.openxmlformats.org/package/2006/metadata/core-properties"/>
-    <ds:schemaRef ds:uri="http://purl.org/dc/elements/1.1/"/>
-    <ds:schemaRef ds:uri="e9bb39ac-ea54-4350-abd5-7ff991ff1845"/>
-    <ds:schemaRef ds:uri="http://schemas.microsoft.com/sharepoint/v3"/>
-    <ds:schemaRef ds:uri="http://schemas.microsoft.com/office/2006/metadata/properties"/>
+    <ds:schemaRef ds:uri="http://schemas.microsoft.com/sharepoint/v3/contenttype/forms"/>
   </ds:schemaRefs>
 </ds:datastoreItem>
 </file>
</xml_diff>